<commit_message>
added check on learning question at the end
</commit_message>
<xml_diff>
--- a/Counter_Malign_Information/4-Implement-For_Instructors/Lesson_Plans/Lesson_01-Creating_Synthetic_Content/Audio_Visual-Template/MASTER-Lesson_Slide-Create_AI_Content.pptx
+++ b/Counter_Malign_Information/4-Implement-For_Instructors/Lesson_Plans/Lesson_01-Creating_Synthetic_Content/Audio_Visual-Template/MASTER-Lesson_Slide-Create_AI_Content.pptx
@@ -5,7 +5,7 @@
     <p:sldMasterId id="2147483648" r:id="rId1"/>
   </p:sldMasterIdLst>
   <p:notesMasterIdLst>
-    <p:notesMasterId r:id="rId19"/>
+    <p:notesMasterId r:id="rId23"/>
   </p:notesMasterIdLst>
   <p:sldIdLst>
     <p:sldId id="256" r:id="rId2"/>
@@ -19,12 +19,16 @@
     <p:sldId id="264" r:id="rId10"/>
     <p:sldId id="265" r:id="rId11"/>
     <p:sldId id="266" r:id="rId12"/>
-    <p:sldId id="267" r:id="rId13"/>
-    <p:sldId id="268" r:id="rId14"/>
-    <p:sldId id="269" r:id="rId15"/>
-    <p:sldId id="270" r:id="rId16"/>
-    <p:sldId id="271" r:id="rId17"/>
-    <p:sldId id="272" r:id="rId18"/>
+    <p:sldId id="273" r:id="rId13"/>
+    <p:sldId id="274" r:id="rId14"/>
+    <p:sldId id="275" r:id="rId15"/>
+    <p:sldId id="276" r:id="rId16"/>
+    <p:sldId id="269" r:id="rId17"/>
+    <p:sldId id="270" r:id="rId18"/>
+    <p:sldId id="267" r:id="rId19"/>
+    <p:sldId id="268" r:id="rId20"/>
+    <p:sldId id="271" r:id="rId21"/>
+    <p:sldId id="272" r:id="rId22"/>
   </p:sldIdLst>
   <p:sldSz cx="12192000" cy="6858000"/>
   <p:notesSz cx="6858000" cy="9144000"/>
@@ -326,6 +330,11 @@
       </a:defRPr>
     </a:lvl9pPr>
   </p:defaultTextStyle>
+  <p:extLst>
+    <p:ext uri="{EFAFB233-063F-42B5-8137-9DF3F51BA10A}">
+      <p15:sldGuideLst xmlns:p15="http://schemas.microsoft.com/office/powerpoint/2012/main"/>
+    </p:ext>
+  </p:extLst>
 </p:presentation>
 </file>
 
@@ -2270,7 +2279,7 @@
           </a:ln>
           <a:extLst>
             <a:ext uri="{C572A759-6A51-4108-AA02-DFA0A04FC94B}">
-              <ma14:wrappingTextBoxFlag xmlns:ma14="http://schemas.microsoft.com/office/mac/drawingml/2011/main" xmlns:a14="http://schemas.microsoft.com/office/drawing/2010/main" xmlns:m="http://schemas.openxmlformats.org/officeDocument/2006/math" xmlns="" val="1"/>
+              <ma14:wrappingTextBoxFlag xmlns="" xmlns:m="http://schemas.openxmlformats.org/officeDocument/2006/math" xmlns:a14="http://schemas.microsoft.com/office/drawing/2010/main" xmlns:ma14="http://schemas.microsoft.com/office/mac/drawingml/2011/main" val="1"/>
             </a:ext>
           </a:extLst>
         </p:spPr>
@@ -2309,7 +2318,7 @@
           </a:ln>
           <a:extLst>
             <a:ext uri="{C572A759-6A51-4108-AA02-DFA0A04FC94B}">
-              <ma14:wrappingTextBoxFlag xmlns:ma14="http://schemas.microsoft.com/office/mac/drawingml/2011/main" xmlns:a14="http://schemas.microsoft.com/office/drawing/2010/main" xmlns:m="http://schemas.openxmlformats.org/officeDocument/2006/math" xmlns="" val="1"/>
+              <ma14:wrappingTextBoxFlag xmlns="" xmlns:m="http://schemas.openxmlformats.org/officeDocument/2006/math" xmlns:a14="http://schemas.microsoft.com/office/drawing/2010/main" xmlns:ma14="http://schemas.microsoft.com/office/mac/drawingml/2011/main" val="1"/>
             </a:ext>
           </a:extLst>
         </p:spPr>
@@ -3255,7 +3264,7 @@
           </a:prstGeom>
           <a:extLst>
             <a:ext uri="{C572A759-6A51-4108-AA02-DFA0A04FC94B}">
-              <ma14:wrappingTextBoxFlag xmlns:ma14="http://schemas.microsoft.com/office/mac/drawingml/2011/main" xmlns:a14="http://schemas.microsoft.com/office/drawing/2010/main" xmlns:m="http://schemas.openxmlformats.org/officeDocument/2006/math" xmlns="" val="1"/>
+              <ma14:wrappingTextBoxFlag xmlns="" xmlns:m="http://schemas.openxmlformats.org/officeDocument/2006/math" xmlns:a14="http://schemas.microsoft.com/office/drawing/2010/main" xmlns:ma14="http://schemas.microsoft.com/office/mac/drawingml/2011/main" val="1"/>
             </a:ext>
           </a:extLst>
         </p:spPr>
@@ -3296,7 +3305,7 @@
           </a:ln>
           <a:extLst>
             <a:ext uri="{C572A759-6A51-4108-AA02-DFA0A04FC94B}">
-              <ma14:wrappingTextBoxFlag xmlns:ma14="http://schemas.microsoft.com/office/mac/drawingml/2011/main" xmlns:a14="http://schemas.microsoft.com/office/drawing/2010/main" xmlns:m="http://schemas.openxmlformats.org/officeDocument/2006/math" xmlns="" val="1"/>
+              <ma14:wrappingTextBoxFlag xmlns="" xmlns:m="http://schemas.openxmlformats.org/officeDocument/2006/math" xmlns:a14="http://schemas.microsoft.com/office/drawing/2010/main" xmlns:ma14="http://schemas.microsoft.com/office/mac/drawingml/2011/main" val="1"/>
             </a:ext>
           </a:extLst>
         </p:spPr>
@@ -3337,7 +3346,7 @@
           </a:ln>
           <a:extLst>
             <a:ext uri="{C572A759-6A51-4108-AA02-DFA0A04FC94B}">
-              <ma14:wrappingTextBoxFlag xmlns:ma14="http://schemas.microsoft.com/office/mac/drawingml/2011/main" xmlns:a14="http://schemas.microsoft.com/office/drawing/2010/main" xmlns:m="http://schemas.openxmlformats.org/officeDocument/2006/math" xmlns="" val="1"/>
+              <ma14:wrappingTextBoxFlag xmlns="" xmlns:m="http://schemas.openxmlformats.org/officeDocument/2006/math" xmlns:a14="http://schemas.microsoft.com/office/drawing/2010/main" xmlns:ma14="http://schemas.microsoft.com/office/mac/drawingml/2011/main" val="1"/>
             </a:ext>
           </a:extLst>
         </p:spPr>
@@ -3378,7 +3387,7 @@
           </a:ln>
           <a:extLst>
             <a:ext uri="{C572A759-6A51-4108-AA02-DFA0A04FC94B}">
-              <ma14:wrappingTextBoxFlag xmlns:ma14="http://schemas.microsoft.com/office/mac/drawingml/2011/main" xmlns:a14="http://schemas.microsoft.com/office/drawing/2010/main" xmlns:m="http://schemas.openxmlformats.org/officeDocument/2006/math" xmlns="" val="1"/>
+              <ma14:wrappingTextBoxFlag xmlns="" xmlns:m="http://schemas.openxmlformats.org/officeDocument/2006/math" xmlns:a14="http://schemas.microsoft.com/office/drawing/2010/main" xmlns:ma14="http://schemas.microsoft.com/office/mac/drawingml/2011/main" val="1"/>
             </a:ext>
           </a:extLst>
         </p:spPr>
@@ -3425,7 +3434,7 @@
           </a:ln>
           <a:extLst>
             <a:ext uri="{C572A759-6A51-4108-AA02-DFA0A04FC94B}">
-              <ma14:wrappingTextBoxFlag xmlns:ma14="http://schemas.microsoft.com/office/mac/drawingml/2011/main" xmlns:a14="http://schemas.microsoft.com/office/drawing/2010/main" xmlns:m="http://schemas.openxmlformats.org/officeDocument/2006/math" xmlns="" val="1"/>
+              <ma14:wrappingTextBoxFlag xmlns="" xmlns:m="http://schemas.openxmlformats.org/officeDocument/2006/math" xmlns:a14="http://schemas.microsoft.com/office/drawing/2010/main" xmlns:ma14="http://schemas.microsoft.com/office/mac/drawingml/2011/main" val="1"/>
             </a:ext>
           </a:extLst>
         </p:spPr>
@@ -3627,7 +3636,7 @@
           </a:prstGeom>
           <a:extLst>
             <a:ext uri="{C572A759-6A51-4108-AA02-DFA0A04FC94B}">
-              <ma14:wrappingTextBoxFlag xmlns:ma14="http://schemas.microsoft.com/office/mac/drawingml/2011/main" xmlns:a14="http://schemas.microsoft.com/office/drawing/2010/main" xmlns:m="http://schemas.openxmlformats.org/officeDocument/2006/math" xmlns="" val="1"/>
+              <ma14:wrappingTextBoxFlag xmlns="" xmlns:m="http://schemas.openxmlformats.org/officeDocument/2006/math" xmlns:a14="http://schemas.microsoft.com/office/drawing/2010/main" xmlns:ma14="http://schemas.microsoft.com/office/mac/drawingml/2011/main" val="1"/>
             </a:ext>
           </a:extLst>
         </p:spPr>
@@ -3818,7 +3827,7 @@
           </a:prstGeom>
           <a:extLst>
             <a:ext uri="{C572A759-6A51-4108-AA02-DFA0A04FC94B}">
-              <ma14:wrappingTextBoxFlag xmlns:ma14="http://schemas.microsoft.com/office/mac/drawingml/2011/main" xmlns:a14="http://schemas.microsoft.com/office/drawing/2010/main" xmlns:m="http://schemas.openxmlformats.org/officeDocument/2006/math" xmlns="" val="1"/>
+              <ma14:wrappingTextBoxFlag xmlns="" xmlns:m="http://schemas.openxmlformats.org/officeDocument/2006/math" xmlns:a14="http://schemas.microsoft.com/office/drawing/2010/main" xmlns:ma14="http://schemas.microsoft.com/office/mac/drawingml/2011/main" val="1"/>
             </a:ext>
           </a:extLst>
         </p:spPr>
@@ -3848,7 +3857,7 @@
     <p:bg>
       <p:bgPr>
         <a:solidFill>
-          <a:srgbClr val="FFFB00"/>
+          <a:srgbClr val="FFFF00"/>
         </a:solidFill>
         <a:effectLst/>
       </p:bgPr>
@@ -3869,7 +3878,43 @@
       </p:grpSpPr>
       <p:sp>
         <p:nvSpPr>
-          <p:cNvPr id="177" name="AI Tool Master Lists"/>
+          <p:cNvPr id="147" name="Slide Number"/>
+          <p:cNvSpPr txBox="1">
+            <a:spLocks noGrp="1"/>
+          </p:cNvSpPr>
+          <p:nvPr>
+            <p:ph type="sldNum" sz="quarter" idx="2"/>
+          </p:nvPr>
+        </p:nvSpPr>
+        <p:spPr>
+          <a:xfrm>
+            <a:off x="11172418" y="6414760"/>
+            <a:ext cx="181382" cy="248305"/>
+          </a:xfrm>
+          <a:prstGeom prst="rect">
+            <a:avLst/>
+          </a:prstGeom>
+          <a:extLst>
+            <a:ext uri="{C572A759-6A51-4108-AA02-DFA0A04FC94B}">
+              <ma14:wrappingTextBoxFlag xmlns:ma14="http://schemas.microsoft.com/office/mac/drawingml/2011/main" xmlns:a14="http://schemas.microsoft.com/office/drawing/2010/main" xmlns:m="http://schemas.openxmlformats.org/officeDocument/2006/math" xmlns="" val="1"/>
+            </a:ext>
+          </a:extLst>
+        </p:spPr>
+        <p:txBody>
+          <a:bodyPr/>
+          <a:lstStyle/>
+          <a:p>
+            <a:fld id="{86CB4B4D-7CA3-9044-876B-883B54F8677D}" type="slidenum">
+              <a:rPr/>
+              <a:t>12</a:t>
+            </a:fld>
+            <a:endParaRPr/>
+          </a:p>
+        </p:txBody>
+      </p:sp>
+      <p:sp>
+        <p:nvSpPr>
+          <p:cNvPr id="148" name="Mejores prácticas para generar contenido de inteligencia artificial"/>
           <p:cNvSpPr txBox="1">
             <a:spLocks noGrp="1"/>
           </p:cNvSpPr>
@@ -3887,22 +3932,28 @@
           <a:lstStyle/>
           <a:p>
             <a:r>
-              <a:t>AI Tool Master Lists</a:t>
-            </a:r>
+              <a:rPr lang="en-US" dirty="0"/>
+              <a:t>Best Practices for Generating AI Content</a:t>
+            </a:r>
+            <a:endParaRPr dirty="0"/>
           </a:p>
         </p:txBody>
       </p:sp>
       <p:sp>
         <p:nvSpPr>
-          <p:cNvPr id="178" name="(&quot;AI tools&quot; OR &quot;GPT tools&quot; OR &quot;AI resources&quot; OR &quot;AI catalog&quot; OR &quot;AI list&quot; OR &quot;AI repository&quot; OR &quot;generative AI&quot;) (&quot;list&quot; OR &quot;collection&quot; OR &quot;catalog&quot; OR &quot;repository&quot; OR &quot;guide&quot;)…"/>
+          <p:cNvPr id="149" name="Verifique la precisión…"/>
           <p:cNvSpPr txBox="1">
             <a:spLocks noGrp="1"/>
           </p:cNvSpPr>
           <p:nvPr>
-            <p:ph type="body" idx="1"/>
+            <p:ph type="body" sz="half" idx="1"/>
           </p:nvPr>
         </p:nvSpPr>
         <p:spPr>
+          <a:xfrm>
+            <a:off x="6791676" y="2028522"/>
+            <a:ext cx="5264183" cy="4048404"/>
+          </a:xfrm>
           <a:prstGeom prst="rect">
             <a:avLst/>
           </a:prstGeom>
@@ -3911,123 +3962,606 @@
           <a:bodyPr/>
           <a:lstStyle/>
           <a:p>
-            <a:pPr>
-              <a:defRPr>
-                <a:solidFill>
-                  <a:schemeClr val="accent3">
-                    <a:lumOff val="-12941"/>
-                  </a:schemeClr>
-                </a:solidFill>
+            <a:pPr marL="457200" indent="-317500" defTabSz="457200">
+              <a:lnSpc>
+                <a:spcPct val="100000"/>
+              </a:lnSpc>
+              <a:spcBef>
+                <a:spcPts val="0"/>
+              </a:spcBef>
+              <a:buClr>
+                <a:srgbClr val="1F2328"/>
+              </a:buClr>
+              <a:buFont typeface="TimesNewRomanPSMT"/>
+              <a:buAutoNum type="arabicPeriod"/>
+              <a:defRPr sz="2600">
+                <a:solidFill>
+                  <a:srgbClr val="1F2328"/>
+                </a:solidFill>
+                <a:latin typeface="Helvetica Neue"/>
+                <a:ea typeface="Helvetica Neue"/>
+                <a:cs typeface="Helvetica Neue"/>
+                <a:sym typeface="Helvetica Neue"/>
               </a:defRPr>
             </a:pPr>
             <a:r>
-              <a:t>("AI tools" OR "GPT tools" OR "AI resources" OR "AI catalog" OR "AI list" OR "AI repository" OR "generative AI") ("list" OR "collection" OR "catalog" OR "repository" OR "guide") </a:t>
-            </a:r>
-          </a:p>
-          <a:p>
-            <a:r>
-              <a:t>AI Master List Tool - </a:t>
-            </a:r>
-            <a:r>
-              <a:rPr u="sng">
-                <a:solidFill>
-                  <a:srgbClr val="0563C1"/>
-                </a:solidFill>
-                <a:uFill>
-                  <a:solidFill>
-                    <a:srgbClr val="0563C1"/>
-                  </a:solidFill>
-                </a:uFill>
-                <a:hlinkClick r:id="rId2"/>
-              </a:rPr>
-              <a:t>https://doc.clickup.com/25598832/d/h/rd6vg-14247/0b79ca1dc0f7429/rd6vg-12207</a:t>
-            </a:r>
-            <a:r>
+              <a:rPr b="1" dirty="0" err="1">
+                <a:solidFill>
+                  <a:schemeClr val="tx1"/>
+                </a:solidFill>
+                <a:highlight>
+                  <a:srgbClr val="000000"/>
+                </a:highlight>
+                <a:latin typeface="+mn-lt"/>
+                <a:ea typeface="+mn-ea"/>
+                <a:cs typeface="+mn-cs"/>
+                <a:sym typeface="Helvetica"/>
+              </a:rPr>
+              <a:t>Verifique</a:t>
+            </a:r>
+            <a:r>
+              <a:rPr b="1" dirty="0">
+                <a:solidFill>
+                  <a:schemeClr val="tx1"/>
+                </a:solidFill>
+                <a:highlight>
+                  <a:srgbClr val="000000"/>
+                </a:highlight>
+                <a:latin typeface="+mn-lt"/>
+                <a:ea typeface="+mn-ea"/>
+                <a:cs typeface="+mn-cs"/>
+                <a:sym typeface="Helvetica"/>
+              </a:rPr>
+              <a:t> la </a:t>
+            </a:r>
+            <a:r>
+              <a:rPr b="1" dirty="0" err="1">
+                <a:solidFill>
+                  <a:schemeClr val="tx1"/>
+                </a:solidFill>
+                <a:highlight>
+                  <a:srgbClr val="000000"/>
+                </a:highlight>
+                <a:latin typeface="+mn-lt"/>
+                <a:ea typeface="+mn-ea"/>
+                <a:cs typeface="+mn-cs"/>
+                <a:sym typeface="Helvetica"/>
+              </a:rPr>
+              <a:t>precisión</a:t>
+            </a:r>
+            <a:endParaRPr dirty="0">
+              <a:solidFill>
+                <a:schemeClr val="tx1"/>
+              </a:solidFill>
+              <a:highlight>
+                <a:srgbClr val="000000"/>
+              </a:highlight>
+              <a:latin typeface="+mn-lt"/>
+              <a:ea typeface="+mn-ea"/>
+              <a:cs typeface="+mn-cs"/>
+              <a:sym typeface="Helvetica"/>
+            </a:endParaRPr>
+          </a:p>
+          <a:p>
+            <a:pPr marL="457200" indent="-317500" defTabSz="457200">
+              <a:lnSpc>
+                <a:spcPct val="100000"/>
+              </a:lnSpc>
+              <a:spcBef>
+                <a:spcPts val="0"/>
+              </a:spcBef>
+              <a:buClr>
+                <a:srgbClr val="1F2328"/>
+              </a:buClr>
+              <a:buFont typeface="TimesNewRomanPSMT"/>
+              <a:buAutoNum type="arabicPeriod"/>
+              <a:defRPr sz="2600">
+                <a:solidFill>
+                  <a:srgbClr val="0433FF"/>
+                </a:solidFill>
+                <a:latin typeface="Helvetica Neue"/>
+                <a:ea typeface="Helvetica Neue"/>
+                <a:cs typeface="Helvetica Neue"/>
+                <a:sym typeface="Helvetica Neue"/>
+              </a:defRPr>
+            </a:pPr>
+            <a:r>
+              <a:rPr b="1" dirty="0">
+                <a:solidFill>
+                  <a:schemeClr val="tx1"/>
+                </a:solidFill>
+                <a:highlight>
+                  <a:srgbClr val="000000"/>
+                </a:highlight>
+                <a:latin typeface="+mn-lt"/>
+                <a:ea typeface="+mn-ea"/>
+                <a:cs typeface="+mn-cs"/>
+                <a:sym typeface="Helvetica"/>
+              </a:rPr>
+              <a:t>Sea </a:t>
+            </a:r>
+            <a:r>
+              <a:rPr b="1" dirty="0" err="1">
+                <a:solidFill>
+                  <a:schemeClr val="tx1"/>
+                </a:solidFill>
+                <a:highlight>
+                  <a:srgbClr val="000000"/>
+                </a:highlight>
+                <a:latin typeface="+mn-lt"/>
+                <a:ea typeface="+mn-ea"/>
+                <a:cs typeface="+mn-cs"/>
+                <a:sym typeface="Helvetica"/>
+              </a:rPr>
+              <a:t>específico</a:t>
+            </a:r>
+            <a:endParaRPr b="1" dirty="0">
+              <a:solidFill>
+                <a:schemeClr val="tx1"/>
+              </a:solidFill>
+              <a:highlight>
+                <a:srgbClr val="000000"/>
+              </a:highlight>
+              <a:latin typeface="+mn-lt"/>
+              <a:ea typeface="+mn-ea"/>
+              <a:cs typeface="+mn-cs"/>
+              <a:sym typeface="Helvetica"/>
+            </a:endParaRPr>
+          </a:p>
+          <a:p>
+            <a:pPr marL="457200" indent="-317500" defTabSz="457200">
+              <a:lnSpc>
+                <a:spcPct val="100000"/>
+              </a:lnSpc>
+              <a:spcBef>
+                <a:spcPts val="0"/>
+              </a:spcBef>
+              <a:buClr>
+                <a:srgbClr val="1F2328"/>
+              </a:buClr>
+              <a:buFont typeface="TimesNewRomanPSMT"/>
+              <a:buAutoNum type="arabicPeriod"/>
+              <a:defRPr sz="2600">
+                <a:solidFill>
+                  <a:srgbClr val="FF9300"/>
+                </a:solidFill>
+                <a:latin typeface="Helvetica Neue"/>
+                <a:ea typeface="Helvetica Neue"/>
+                <a:cs typeface="Helvetica Neue"/>
+                <a:sym typeface="Helvetica Neue"/>
+              </a:defRPr>
+            </a:pPr>
+            <a:r>
+              <a:rPr b="1" dirty="0" err="1">
+                <a:solidFill>
+                  <a:schemeClr val="tx1"/>
+                </a:solidFill>
+                <a:highlight>
+                  <a:srgbClr val="000000"/>
+                </a:highlight>
+                <a:latin typeface="+mn-lt"/>
+                <a:ea typeface="+mn-ea"/>
+                <a:cs typeface="+mn-cs"/>
+                <a:sym typeface="Helvetica"/>
+              </a:rPr>
+              <a:t>Iterar</a:t>
+            </a:r>
+            <a:r>
+              <a:rPr b="1" dirty="0">
+                <a:solidFill>
+                  <a:schemeClr val="tx1"/>
+                </a:solidFill>
+                <a:highlight>
+                  <a:srgbClr val="000000"/>
+                </a:highlight>
+                <a:latin typeface="+mn-lt"/>
+                <a:ea typeface="+mn-ea"/>
+                <a:cs typeface="+mn-cs"/>
+                <a:sym typeface="Helvetica"/>
+              </a:rPr>
+              <a:t> y </a:t>
+            </a:r>
+            <a:r>
+              <a:rPr b="1" dirty="0" err="1">
+                <a:solidFill>
+                  <a:schemeClr val="tx1"/>
+                </a:solidFill>
+                <a:highlight>
+                  <a:srgbClr val="000000"/>
+                </a:highlight>
+                <a:latin typeface="+mn-lt"/>
+                <a:ea typeface="+mn-ea"/>
+                <a:cs typeface="+mn-cs"/>
+                <a:sym typeface="Helvetica"/>
+              </a:rPr>
+              <a:t>refinar</a:t>
+            </a:r>
+            <a:endParaRPr b="1" dirty="0">
+              <a:solidFill>
+                <a:schemeClr val="tx1"/>
+              </a:solidFill>
+              <a:highlight>
+                <a:srgbClr val="000000"/>
+              </a:highlight>
+              <a:latin typeface="+mn-lt"/>
+              <a:ea typeface="+mn-ea"/>
+              <a:cs typeface="+mn-cs"/>
+              <a:sym typeface="Helvetica"/>
+            </a:endParaRPr>
+          </a:p>
+          <a:p>
+            <a:pPr marL="457200" indent="-317500" defTabSz="457200">
+              <a:lnSpc>
+                <a:spcPct val="100000"/>
+              </a:lnSpc>
+              <a:spcBef>
+                <a:spcPts val="0"/>
+              </a:spcBef>
+              <a:buClr>
+                <a:srgbClr val="1F2328"/>
+              </a:buClr>
+              <a:buFont typeface="TimesNewRomanPSMT"/>
+              <a:buAutoNum type="arabicPeriod"/>
+              <a:defRPr sz="2600">
+                <a:solidFill>
+                  <a:srgbClr val="FF40FF"/>
+                </a:solidFill>
+                <a:latin typeface="Helvetica Neue"/>
+                <a:ea typeface="Helvetica Neue"/>
+                <a:cs typeface="Helvetica Neue"/>
+                <a:sym typeface="Helvetica Neue"/>
+              </a:defRPr>
+            </a:pPr>
+            <a:r>
+              <a:rPr b="1" dirty="0" err="1">
+                <a:solidFill>
+                  <a:schemeClr val="tx1"/>
+                </a:solidFill>
+                <a:highlight>
+                  <a:srgbClr val="000000"/>
+                </a:highlight>
+                <a:latin typeface="+mn-lt"/>
+                <a:ea typeface="+mn-ea"/>
+                <a:cs typeface="+mn-cs"/>
+                <a:sym typeface="Helvetica"/>
+              </a:rPr>
+              <a:t>Proporcionar</a:t>
+            </a:r>
+            <a:r>
+              <a:rPr b="1" dirty="0">
+                <a:solidFill>
+                  <a:schemeClr val="tx1"/>
+                </a:solidFill>
+                <a:highlight>
+                  <a:srgbClr val="000000"/>
+                </a:highlight>
+                <a:latin typeface="+mn-lt"/>
+                <a:ea typeface="+mn-ea"/>
+                <a:cs typeface="+mn-cs"/>
+                <a:sym typeface="Helvetica"/>
+              </a:rPr>
               <a:t> </a:t>
             </a:r>
-          </a:p>
-          <a:p>
-            <a:r>
-              <a:t>AI Catalog Repo - </a:t>
-            </a:r>
-            <a:r>
-              <a:rPr u="sng">
-                <a:solidFill>
-                  <a:srgbClr val="0563C1"/>
-                </a:solidFill>
-                <a:uFill>
-                  <a:solidFill>
-                    <a:srgbClr val="0563C1"/>
-                  </a:solidFill>
-                </a:uFill>
-                <a:hlinkClick r:id="rId3"/>
-              </a:rPr>
-              <a:t>https://github.com/mehmetkahya0/ai-catalog</a:t>
-            </a:r>
-            <a:r>
+            <a:r>
+              <a:rPr b="1" dirty="0" err="1">
+                <a:solidFill>
+                  <a:schemeClr val="tx1"/>
+                </a:solidFill>
+                <a:highlight>
+                  <a:srgbClr val="000000"/>
+                </a:highlight>
+                <a:latin typeface="+mn-lt"/>
+                <a:ea typeface="+mn-ea"/>
+                <a:cs typeface="+mn-cs"/>
+                <a:sym typeface="Helvetica"/>
+              </a:rPr>
+              <a:t>contexto</a:t>
+            </a:r>
+            <a:endParaRPr b="1" dirty="0">
+              <a:solidFill>
+                <a:schemeClr val="tx1"/>
+              </a:solidFill>
+              <a:highlight>
+                <a:srgbClr val="000000"/>
+              </a:highlight>
+              <a:latin typeface="+mn-lt"/>
+              <a:ea typeface="+mn-ea"/>
+              <a:cs typeface="+mn-cs"/>
+              <a:sym typeface="Helvetica"/>
+            </a:endParaRPr>
+          </a:p>
+          <a:p>
+            <a:pPr marL="457200" indent="-317500" defTabSz="457200">
+              <a:lnSpc>
+                <a:spcPct val="100000"/>
+              </a:lnSpc>
+              <a:spcBef>
+                <a:spcPts val="0"/>
+              </a:spcBef>
+              <a:buClr>
+                <a:srgbClr val="1F2328"/>
+              </a:buClr>
+              <a:buFont typeface="TimesNewRomanPSMT"/>
+              <a:buAutoNum type="arabicPeriod"/>
+              <a:defRPr sz="2600">
+                <a:solidFill>
+                  <a:srgbClr val="1F2328"/>
+                </a:solidFill>
+                <a:latin typeface="Helvetica Neue"/>
+                <a:ea typeface="Helvetica Neue"/>
+                <a:cs typeface="Helvetica Neue"/>
+                <a:sym typeface="Helvetica Neue"/>
+              </a:defRPr>
+            </a:pPr>
+            <a:r>
+              <a:rPr b="1" dirty="0" err="1">
+                <a:solidFill>
+                  <a:schemeClr val="tx1"/>
+                </a:solidFill>
+                <a:highlight>
+                  <a:srgbClr val="000000"/>
+                </a:highlight>
+                <a:latin typeface="+mn-lt"/>
+                <a:ea typeface="+mn-ea"/>
+                <a:cs typeface="+mn-cs"/>
+                <a:sym typeface="Helvetica"/>
+              </a:rPr>
+              <a:t>Utilice</a:t>
+            </a:r>
+            <a:r>
+              <a:rPr b="1" dirty="0">
+                <a:solidFill>
+                  <a:schemeClr val="tx1"/>
+                </a:solidFill>
+                <a:highlight>
+                  <a:srgbClr val="000000"/>
+                </a:highlight>
+                <a:latin typeface="+mn-lt"/>
+                <a:ea typeface="+mn-ea"/>
+                <a:cs typeface="+mn-cs"/>
+                <a:sym typeface="Helvetica"/>
+              </a:rPr>
               <a:t> </a:t>
             </a:r>
-          </a:p>
-          <a:p>
-            <a:r>
-              <a:t>- Awesome Generative AI - </a:t>
-            </a:r>
-            <a:r>
-              <a:rPr u="sng">
-                <a:solidFill>
-                  <a:srgbClr val="0563C1"/>
-                </a:solidFill>
-                <a:uFill>
-                  <a:solidFill>
-                    <a:srgbClr val="0563C1"/>
-                  </a:solidFill>
-                </a:uFill>
-                <a:hlinkClick r:id="rId4"/>
-              </a:rPr>
-              <a:t>https://github.com/amusi/awesome-ai-awesomeness</a:t>
-            </a:r>
-            <a:r>
+            <a:r>
+              <a:rPr b="1" dirty="0" err="1">
+                <a:solidFill>
+                  <a:schemeClr val="tx1"/>
+                </a:solidFill>
+                <a:highlight>
+                  <a:srgbClr val="000000"/>
+                </a:highlight>
+                <a:latin typeface="+mn-lt"/>
+                <a:ea typeface="+mn-ea"/>
+                <a:cs typeface="+mn-cs"/>
+                <a:sym typeface="Helvetica"/>
+              </a:rPr>
+              <a:t>múltiples</a:t>
+            </a:r>
+            <a:r>
+              <a:rPr b="1" dirty="0">
+                <a:solidFill>
+                  <a:schemeClr val="tx1"/>
+                </a:solidFill>
+                <a:highlight>
+                  <a:srgbClr val="000000"/>
+                </a:highlight>
+                <a:latin typeface="+mn-lt"/>
+                <a:ea typeface="+mn-ea"/>
+                <a:cs typeface="+mn-cs"/>
+                <a:sym typeface="Helvetica"/>
+              </a:rPr>
               <a:t> </a:t>
             </a:r>
-          </a:p>
-          <a:p>
-            <a:r>
-              <a:t>FutureTools - </a:t>
-            </a:r>
-            <a:r>
-              <a:rPr u="sng">
-                <a:solidFill>
-                  <a:srgbClr val="0563C1"/>
-                </a:solidFill>
-                <a:uFill>
-                  <a:solidFill>
-                    <a:srgbClr val="0563C1"/>
-                  </a:solidFill>
-                </a:uFill>
-                <a:hlinkClick r:id="rId5"/>
-              </a:rPr>
-              <a:t>https://futuretools.io</a:t>
-            </a:r>
-            <a:r>
+            <a:r>
+              <a:rPr b="1" dirty="0" err="1">
+                <a:solidFill>
+                  <a:schemeClr val="tx1"/>
+                </a:solidFill>
+                <a:highlight>
+                  <a:srgbClr val="000000"/>
+                </a:highlight>
+                <a:latin typeface="+mn-lt"/>
+                <a:ea typeface="+mn-ea"/>
+                <a:cs typeface="+mn-cs"/>
+                <a:sym typeface="Helvetica"/>
+              </a:rPr>
+              <a:t>servicios</a:t>
+            </a:r>
+            <a:endParaRPr b="1" dirty="0">
+              <a:solidFill>
+                <a:schemeClr val="tx1"/>
+              </a:solidFill>
+              <a:highlight>
+                <a:srgbClr val="000000"/>
+              </a:highlight>
+              <a:latin typeface="+mn-lt"/>
+              <a:ea typeface="+mn-ea"/>
+              <a:cs typeface="+mn-cs"/>
+              <a:sym typeface="Helvetica"/>
+            </a:endParaRPr>
+          </a:p>
+          <a:p>
+            <a:pPr marL="457200" indent="-317500" defTabSz="457200">
+              <a:lnSpc>
+                <a:spcPct val="100000"/>
+              </a:lnSpc>
+              <a:spcBef>
+                <a:spcPts val="0"/>
+              </a:spcBef>
+              <a:buClr>
+                <a:srgbClr val="1F2328"/>
+              </a:buClr>
+              <a:buFont typeface="TimesNewRomanPSMT"/>
+              <a:buAutoNum type="arabicPeriod"/>
+              <a:defRPr sz="2600">
+                <a:solidFill>
+                  <a:srgbClr val="942192"/>
+                </a:solidFill>
+                <a:latin typeface="Helvetica Neue"/>
+                <a:ea typeface="Helvetica Neue"/>
+                <a:cs typeface="Helvetica Neue"/>
+                <a:sym typeface="Helvetica Neue"/>
+              </a:defRPr>
+            </a:pPr>
+            <a:r>
+              <a:rPr b="1" dirty="0" err="1">
+                <a:solidFill>
+                  <a:schemeClr val="tx1"/>
+                </a:solidFill>
+                <a:highlight>
+                  <a:srgbClr val="000000"/>
+                </a:highlight>
+                <a:latin typeface="+mn-lt"/>
+                <a:ea typeface="+mn-ea"/>
+                <a:cs typeface="+mn-cs"/>
+                <a:sym typeface="Helvetica"/>
+              </a:rPr>
+              <a:t>Recuerde</a:t>
+            </a:r>
+            <a:r>
+              <a:rPr b="1" dirty="0">
+                <a:solidFill>
+                  <a:schemeClr val="tx1"/>
+                </a:solidFill>
+                <a:highlight>
+                  <a:srgbClr val="000000"/>
+                </a:highlight>
+                <a:latin typeface="+mn-lt"/>
+                <a:ea typeface="+mn-ea"/>
+                <a:cs typeface="+mn-cs"/>
+                <a:sym typeface="Helvetica"/>
+              </a:rPr>
+              <a:t> de las </a:t>
+            </a:r>
+            <a:r>
+              <a:rPr b="1" dirty="0" err="1">
+                <a:solidFill>
+                  <a:schemeClr val="tx1"/>
+                </a:solidFill>
+                <a:highlight>
+                  <a:srgbClr val="000000"/>
+                </a:highlight>
+                <a:latin typeface="+mn-lt"/>
+                <a:ea typeface="+mn-ea"/>
+                <a:cs typeface="+mn-cs"/>
+                <a:sym typeface="Helvetica"/>
+              </a:rPr>
+              <a:t>restricciones</a:t>
+            </a:r>
+            <a:endParaRPr b="1" dirty="0">
+              <a:solidFill>
+                <a:schemeClr val="tx1"/>
+              </a:solidFill>
+              <a:highlight>
+                <a:srgbClr val="000000"/>
+              </a:highlight>
+              <a:latin typeface="+mn-lt"/>
+              <a:ea typeface="+mn-ea"/>
+              <a:cs typeface="+mn-cs"/>
+              <a:sym typeface="Helvetica"/>
+            </a:endParaRPr>
+          </a:p>
+          <a:p>
+            <a:pPr marL="457200" indent="-317500" defTabSz="457200">
+              <a:lnSpc>
+                <a:spcPct val="100000"/>
+              </a:lnSpc>
+              <a:spcBef>
+                <a:spcPts val="0"/>
+              </a:spcBef>
+              <a:buClr>
+                <a:srgbClr val="1F2328"/>
+              </a:buClr>
+              <a:buFont typeface="TimesNewRomanPSMT"/>
+              <a:buAutoNum type="arabicPeriod"/>
+              <a:defRPr sz="2600">
+                <a:solidFill>
+                  <a:srgbClr val="1F2328"/>
+                </a:solidFill>
+                <a:latin typeface="Helvetica Neue"/>
+                <a:ea typeface="Helvetica Neue"/>
+                <a:cs typeface="Helvetica Neue"/>
+                <a:sym typeface="Helvetica Neue"/>
+              </a:defRPr>
+            </a:pPr>
+            <a:r>
+              <a:rPr b="1" dirty="0" err="1">
+                <a:solidFill>
+                  <a:schemeClr val="tx1"/>
+                </a:solidFill>
+                <a:highlight>
+                  <a:srgbClr val="000000"/>
+                </a:highlight>
+                <a:latin typeface="+mn-lt"/>
+                <a:ea typeface="+mn-ea"/>
+                <a:cs typeface="+mn-cs"/>
+                <a:sym typeface="Helvetica"/>
+              </a:rPr>
+              <a:t>Crear</a:t>
+            </a:r>
+            <a:r>
+              <a:rPr b="1" dirty="0">
+                <a:solidFill>
+                  <a:schemeClr val="tx1"/>
+                </a:solidFill>
+                <a:highlight>
+                  <a:srgbClr val="000000"/>
+                </a:highlight>
+                <a:latin typeface="+mn-lt"/>
+                <a:ea typeface="+mn-ea"/>
+                <a:cs typeface="+mn-cs"/>
+                <a:sym typeface="Helvetica"/>
+              </a:rPr>
               <a:t> </a:t>
             </a:r>
+            <a:r>
+              <a:rPr b="1" dirty="0" err="1">
+                <a:solidFill>
+                  <a:schemeClr val="tx1"/>
+                </a:solidFill>
+                <a:highlight>
+                  <a:srgbClr val="000000"/>
+                </a:highlight>
+                <a:latin typeface="+mn-lt"/>
+                <a:ea typeface="+mn-ea"/>
+                <a:cs typeface="+mn-cs"/>
+                <a:sym typeface="Helvetica"/>
+              </a:rPr>
+              <a:t>plantillas</a:t>
+            </a:r>
+            <a:endParaRPr b="1" dirty="0">
+              <a:solidFill>
+                <a:schemeClr val="tx1"/>
+              </a:solidFill>
+              <a:highlight>
+                <a:srgbClr val="000000"/>
+              </a:highlight>
+              <a:latin typeface="+mn-lt"/>
+              <a:ea typeface="+mn-ea"/>
+              <a:cs typeface="+mn-cs"/>
+              <a:sym typeface="Helvetica"/>
+            </a:endParaRPr>
           </a:p>
         </p:txBody>
       </p:sp>
       <p:sp>
         <p:nvSpPr>
-          <p:cNvPr id="179" name="Slide Number"/>
-          <p:cNvSpPr txBox="1">
-            <a:spLocks noGrp="1"/>
-          </p:cNvSpPr>
-          <p:nvPr>
-            <p:ph type="sldNum" sz="quarter" idx="2"/>
-          </p:nvPr>
+          <p:cNvPr id="150" name="Content Placeholder 2"/>
+          <p:cNvSpPr txBox="1"/>
+          <p:nvPr/>
         </p:nvSpPr>
         <p:spPr>
+          <a:xfrm>
+            <a:off x="19327" y="2028522"/>
+            <a:ext cx="4609515" cy="4351339"/>
+          </a:xfrm>
           <a:prstGeom prst="rect">
             <a:avLst/>
           </a:prstGeom>
+          <a:ln w="12700">
+            <a:miter lim="400000"/>
+          </a:ln>
           <a:extLst>
             <a:ext uri="{C572A759-6A51-4108-AA02-DFA0A04FC94B}">
               <ma14:wrappingTextBoxFlag xmlns:ma14="http://schemas.microsoft.com/office/mac/drawingml/2011/main" xmlns:a14="http://schemas.microsoft.com/office/drawing/2010/main" xmlns:m="http://schemas.openxmlformats.org/officeDocument/2006/math" xmlns="" val="1"/>
@@ -4035,10 +4569,355 @@
           </a:extLst>
         </p:spPr>
         <p:txBody>
-          <a:bodyPr/>
+          <a:bodyPr lIns="45719" rIns="45719">
+            <a:normAutofit/>
+          </a:bodyPr>
           <a:lstStyle/>
           <a:p>
+            <a:pPr marL="457200" indent="-317500" defTabSz="457200">
+              <a:buClr>
+                <a:srgbClr val="1F2328"/>
+              </a:buClr>
+              <a:buSzPct val="100000"/>
+              <a:buFont typeface="TimesNewRomanPSMT"/>
+              <a:buAutoNum type="arabicPeriod"/>
+              <a:defRPr sz="2600">
+                <a:solidFill>
+                  <a:srgbClr val="1F2328"/>
+                </a:solidFill>
+                <a:latin typeface="Helvetica Neue"/>
+                <a:ea typeface="Helvetica Neue"/>
+                <a:cs typeface="Helvetica Neue"/>
+                <a:sym typeface="Helvetica Neue"/>
+              </a:defRPr>
+            </a:pPr>
+            <a:r>
+              <a:rPr b="1" dirty="0">
+                <a:solidFill>
+                  <a:schemeClr val="tx1"/>
+                </a:solidFill>
+                <a:highlight>
+                  <a:srgbClr val="000000"/>
+                </a:highlight>
+                <a:latin typeface="+mn-lt"/>
+                <a:ea typeface="+mn-ea"/>
+                <a:cs typeface="+mn-cs"/>
+                <a:sym typeface="Helvetica"/>
+              </a:rPr>
+              <a:t>Check for Accuracy</a:t>
+            </a:r>
+          </a:p>
+          <a:p>
+            <a:pPr marL="457200" indent="-317500" defTabSz="457200">
+              <a:buClr>
+                <a:srgbClr val="1F2328"/>
+              </a:buClr>
+              <a:buSzPct val="100000"/>
+              <a:buFont typeface="TimesNewRomanPSMT"/>
+              <a:buAutoNum type="arabicPeriod"/>
+              <a:defRPr sz="2600">
+                <a:solidFill>
+                  <a:srgbClr val="0433FF"/>
+                </a:solidFill>
+                <a:latin typeface="Helvetica Neue"/>
+                <a:ea typeface="Helvetica Neue"/>
+                <a:cs typeface="Helvetica Neue"/>
+                <a:sym typeface="Helvetica Neue"/>
+              </a:defRPr>
+            </a:pPr>
+            <a:r>
+              <a:rPr b="1" dirty="0">
+                <a:solidFill>
+                  <a:schemeClr val="tx1"/>
+                </a:solidFill>
+                <a:highlight>
+                  <a:srgbClr val="000000"/>
+                </a:highlight>
+                <a:latin typeface="+mn-lt"/>
+                <a:ea typeface="+mn-ea"/>
+                <a:cs typeface="+mn-cs"/>
+                <a:sym typeface="Helvetica"/>
+              </a:rPr>
+              <a:t>Be Specific</a:t>
+            </a:r>
+            <a:r>
+              <a:rPr dirty="0">
+                <a:solidFill>
+                  <a:schemeClr val="tx1"/>
+                </a:solidFill>
+                <a:highlight>
+                  <a:srgbClr val="000000"/>
+                </a:highlight>
+              </a:rPr>
+              <a:t>: </a:t>
+            </a:r>
+          </a:p>
+          <a:p>
+            <a:pPr marL="457200" indent="-317500" defTabSz="457200">
+              <a:buClr>
+                <a:srgbClr val="1F2328"/>
+              </a:buClr>
+              <a:buSzPct val="100000"/>
+              <a:buFont typeface="TimesNewRomanPSMT"/>
+              <a:buAutoNum type="arabicPeriod"/>
+              <a:defRPr sz="2600">
+                <a:solidFill>
+                  <a:srgbClr val="FF9300"/>
+                </a:solidFill>
+                <a:latin typeface="Helvetica Neue"/>
+                <a:ea typeface="Helvetica Neue"/>
+                <a:cs typeface="Helvetica Neue"/>
+                <a:sym typeface="Helvetica Neue"/>
+              </a:defRPr>
+            </a:pPr>
+            <a:r>
+              <a:rPr b="1" dirty="0">
+                <a:solidFill>
+                  <a:schemeClr val="tx1"/>
+                </a:solidFill>
+                <a:highlight>
+                  <a:srgbClr val="000000"/>
+                </a:highlight>
+                <a:latin typeface="+mn-lt"/>
+                <a:ea typeface="+mn-ea"/>
+                <a:cs typeface="+mn-cs"/>
+                <a:sym typeface="Helvetica"/>
+              </a:rPr>
+              <a:t>Iterate and Refine</a:t>
+            </a:r>
+            <a:r>
+              <a:rPr dirty="0">
+                <a:solidFill>
+                  <a:schemeClr val="tx1"/>
+                </a:solidFill>
+                <a:highlight>
+                  <a:srgbClr val="000000"/>
+                </a:highlight>
+              </a:rPr>
+              <a:t>: </a:t>
+            </a:r>
+          </a:p>
+          <a:p>
+            <a:pPr marL="457200" indent="-317500" defTabSz="457200">
+              <a:buClr>
+                <a:srgbClr val="1F2328"/>
+              </a:buClr>
+              <a:buSzPct val="100000"/>
+              <a:buFont typeface="TimesNewRomanPSMT"/>
+              <a:buAutoNum type="arabicPeriod"/>
+              <a:defRPr sz="2600">
+                <a:solidFill>
+                  <a:srgbClr val="FF40FF"/>
+                </a:solidFill>
+                <a:latin typeface="Helvetica Neue"/>
+                <a:ea typeface="Helvetica Neue"/>
+                <a:cs typeface="Helvetica Neue"/>
+                <a:sym typeface="Helvetica Neue"/>
+              </a:defRPr>
+            </a:pPr>
+            <a:r>
+              <a:rPr b="1" dirty="0">
+                <a:solidFill>
+                  <a:schemeClr val="tx1"/>
+                </a:solidFill>
+                <a:highlight>
+                  <a:srgbClr val="000000"/>
+                </a:highlight>
+                <a:latin typeface="+mn-lt"/>
+                <a:ea typeface="+mn-ea"/>
+                <a:cs typeface="+mn-cs"/>
+                <a:sym typeface="Helvetica"/>
+              </a:rPr>
+              <a:t>Provide Context</a:t>
+            </a:r>
+            <a:r>
+              <a:rPr dirty="0">
+                <a:solidFill>
+                  <a:schemeClr val="tx1"/>
+                </a:solidFill>
+                <a:highlight>
+                  <a:srgbClr val="000000"/>
+                </a:highlight>
+              </a:rPr>
+              <a:t>:</a:t>
+            </a:r>
+          </a:p>
+          <a:p>
+            <a:pPr marL="457200" indent="-317500" defTabSz="457200">
+              <a:buClr>
+                <a:srgbClr val="1F2328"/>
+              </a:buClr>
+              <a:buSzPct val="100000"/>
+              <a:buFont typeface="TimesNewRomanPSMT"/>
+              <a:buAutoNum type="arabicPeriod"/>
+              <a:defRPr sz="2600">
+                <a:solidFill>
+                  <a:srgbClr val="1F2328"/>
+                </a:solidFill>
+                <a:latin typeface="Helvetica Neue"/>
+                <a:ea typeface="Helvetica Neue"/>
+                <a:cs typeface="Helvetica Neue"/>
+                <a:sym typeface="Helvetica Neue"/>
+              </a:defRPr>
+            </a:pPr>
+            <a:r>
+              <a:rPr b="1" dirty="0">
+                <a:solidFill>
+                  <a:schemeClr val="tx1"/>
+                </a:solidFill>
+                <a:highlight>
+                  <a:srgbClr val="000000"/>
+                </a:highlight>
+                <a:latin typeface="+mn-lt"/>
+                <a:ea typeface="+mn-ea"/>
+                <a:cs typeface="+mn-cs"/>
+                <a:sym typeface="Helvetica"/>
+              </a:rPr>
+              <a:t>Use Multiple Services</a:t>
+            </a:r>
+            <a:r>
+              <a:rPr dirty="0">
+                <a:solidFill>
+                  <a:schemeClr val="tx1"/>
+                </a:solidFill>
+                <a:highlight>
+                  <a:srgbClr val="000000"/>
+                </a:highlight>
+              </a:rPr>
+              <a:t>:</a:t>
+            </a:r>
+          </a:p>
+          <a:p>
+            <a:pPr marL="457200" indent="-317500" defTabSz="457200">
+              <a:buClr>
+                <a:srgbClr val="1F2328"/>
+              </a:buClr>
+              <a:buSzPct val="100000"/>
+              <a:buFont typeface="TimesNewRomanPSMT"/>
+              <a:buAutoNum type="arabicPeriod"/>
+              <a:defRPr sz="2600">
+                <a:solidFill>
+                  <a:srgbClr val="942192"/>
+                </a:solidFill>
+                <a:latin typeface="Helvetica Neue"/>
+                <a:ea typeface="Helvetica Neue"/>
+                <a:cs typeface="Helvetica Neue"/>
+                <a:sym typeface="Helvetica Neue"/>
+              </a:defRPr>
+            </a:pPr>
+            <a:r>
+              <a:rPr b="1" dirty="0">
+                <a:solidFill>
+                  <a:schemeClr val="tx1"/>
+                </a:solidFill>
+                <a:highlight>
+                  <a:srgbClr val="000000"/>
+                </a:highlight>
+                <a:latin typeface="+mn-lt"/>
+                <a:ea typeface="+mn-ea"/>
+                <a:cs typeface="+mn-cs"/>
+                <a:sym typeface="Helvetica"/>
+              </a:rPr>
+              <a:t>Remind AI of Constraints</a:t>
+            </a:r>
+            <a:r>
+              <a:rPr dirty="0">
+                <a:solidFill>
+                  <a:schemeClr val="tx1"/>
+                </a:solidFill>
+                <a:highlight>
+                  <a:srgbClr val="000000"/>
+                </a:highlight>
+              </a:rPr>
+              <a:t>:</a:t>
+            </a:r>
+          </a:p>
+          <a:p>
+            <a:pPr marL="457200" indent="-317500" defTabSz="457200">
+              <a:buClr>
+                <a:srgbClr val="1F2328"/>
+              </a:buClr>
+              <a:buSzPct val="100000"/>
+              <a:buFont typeface="TimesNewRomanPSMT"/>
+              <a:buAutoNum type="arabicPeriod"/>
+              <a:defRPr sz="2600">
+                <a:solidFill>
+                  <a:srgbClr val="1F2328"/>
+                </a:solidFill>
+                <a:latin typeface="Helvetica Neue"/>
+                <a:ea typeface="Helvetica Neue"/>
+                <a:cs typeface="Helvetica Neue"/>
+                <a:sym typeface="Helvetica Neue"/>
+              </a:defRPr>
+            </a:pPr>
+            <a:r>
+              <a:rPr b="1" dirty="0">
+                <a:solidFill>
+                  <a:schemeClr val="tx1"/>
+                </a:solidFill>
+                <a:highlight>
+                  <a:srgbClr val="000000"/>
+                </a:highlight>
+                <a:latin typeface="+mn-lt"/>
+                <a:ea typeface="+mn-ea"/>
+                <a:cs typeface="+mn-cs"/>
+                <a:sym typeface="Helvetica"/>
+              </a:rPr>
+              <a:t>Make Templates</a:t>
+            </a:r>
+            <a:r>
+              <a:rPr dirty="0">
+                <a:solidFill>
+                  <a:schemeClr val="tx1"/>
+                </a:solidFill>
+                <a:highlight>
+                  <a:srgbClr val="000000"/>
+                </a:highlight>
+              </a:rPr>
+              <a:t>:</a:t>
+            </a:r>
+          </a:p>
+        </p:txBody>
+      </p:sp>
+      <p:sp>
+        <p:nvSpPr>
+          <p:cNvPr id="151" name="Text"/>
+          <p:cNvSpPr txBox="1"/>
+          <p:nvPr/>
+        </p:nvSpPr>
+        <p:spPr>
+          <a:xfrm>
+            <a:off x="11172418" y="6414760"/>
+            <a:ext cx="181382" cy="248305"/>
+          </a:xfrm>
+          <a:prstGeom prst="rect">
+            <a:avLst/>
+          </a:prstGeom>
+          <a:ln w="12700">
+            <a:miter lim="400000"/>
+          </a:ln>
+          <a:extLst>
+            <a:ext uri="{C572A759-6A51-4108-AA02-DFA0A04FC94B}">
+              <ma14:wrappingTextBoxFlag xmlns:ma14="http://schemas.microsoft.com/office/mac/drawingml/2011/main" xmlns:a14="http://schemas.microsoft.com/office/drawing/2010/main" xmlns:m="http://schemas.openxmlformats.org/officeDocument/2006/math" xmlns="" val="1"/>
+            </a:ext>
+          </a:extLst>
+        </p:spPr>
+        <p:txBody>
+          <a:bodyPr wrap="none" lIns="45719" rIns="45719" anchor="ctr">
+            <a:spAutoFit/>
+          </a:bodyPr>
+          <a:lstStyle>
+            <a:lvl1pPr algn="r">
+              <a:defRPr sz="1200">
+                <a:solidFill>
+                  <a:srgbClr val="888888"/>
+                </a:solidFill>
+              </a:defRPr>
+            </a:lvl1pPr>
+          </a:lstStyle>
+          <a:p>
             <a:fld id="{86CB4B4D-7CA3-9044-876B-883B54F8677D}" type="slidenum">
+              <a:rPr/>
               <a:t>12</a:t>
             </a:fld>
             <a:endParaRPr/>
@@ -4046,6 +4925,11 @@
         </p:txBody>
       </p:sp>
     </p:spTree>
+    <p:extLst>
+      <p:ext uri="{BB962C8B-B14F-4D97-AF65-F5344CB8AC3E}">
+        <p14:creationId xmlns:p14="http://schemas.microsoft.com/office/powerpoint/2010/main" val="583382652"/>
+      </p:ext>
+    </p:extLst>
   </p:cSld>
   <p:clrMapOvr>
     <a:masterClrMapping/>
@@ -4073,7 +4957,42 @@
       </p:grpSpPr>
       <p:sp>
         <p:nvSpPr>
-          <p:cNvPr id="181" name="Listas maestras de herramientas de IA"/>
+          <p:cNvPr id="147" name="Slide Number"/>
+          <p:cNvSpPr txBox="1">
+            <a:spLocks noGrp="1"/>
+          </p:cNvSpPr>
+          <p:nvPr>
+            <p:ph type="sldNum" sz="quarter" idx="2"/>
+          </p:nvPr>
+        </p:nvSpPr>
+        <p:spPr>
+          <a:xfrm>
+            <a:off x="11172418" y="6414760"/>
+            <a:ext cx="181382" cy="248305"/>
+          </a:xfrm>
+          <a:prstGeom prst="rect">
+            <a:avLst/>
+          </a:prstGeom>
+          <a:extLst>
+            <a:ext uri="{C572A759-6A51-4108-AA02-DFA0A04FC94B}">
+              <ma14:wrappingTextBoxFlag xmlns="" xmlns:m="http://schemas.openxmlformats.org/officeDocument/2006/math" xmlns:a14="http://schemas.microsoft.com/office/drawing/2010/main" xmlns:ma14="http://schemas.microsoft.com/office/mac/drawingml/2011/main" val="1"/>
+            </a:ext>
+          </a:extLst>
+        </p:spPr>
+        <p:txBody>
+          <a:bodyPr/>
+          <a:lstStyle/>
+          <a:p>
+            <a:fld id="{86CB4B4D-7CA3-9044-876B-883B54F8677D}" type="slidenum">
+              <a:t>13</a:t>
+            </a:fld>
+            <a:endParaRPr/>
+          </a:p>
+        </p:txBody>
+      </p:sp>
+      <p:sp>
+        <p:nvSpPr>
+          <p:cNvPr id="148" name="Mejores prácticas para generar contenido de inteligencia artificial"/>
           <p:cNvSpPr txBox="1">
             <a:spLocks noGrp="1"/>
           </p:cNvSpPr>
@@ -4091,25 +5010,25 @@
           <a:lstStyle/>
           <a:p>
             <a:r>
-              <a:t>Listas maestras de herramientas de IA</a:t>
+              <a:t>Mejores prácticas para generar contenido de inteligencia artificial</a:t>
             </a:r>
           </a:p>
         </p:txBody>
       </p:sp>
       <p:sp>
         <p:nvSpPr>
-          <p:cNvPr id="182" name="(&quot;AI tools&quot; OR &quot;GPT tools&quot; OR &quot;AI resources&quot; OR &quot;AI catalog&quot; OR &quot;AI list&quot; OR &quot;AI repository&quot; OR &quot;generative AI&quot;) (&quot;list&quot; OR &quot;collection&quot; OR &quot;catalog&quot; OR &quot;repository&quot; OR &quot;guide&quot;)…"/>
+          <p:cNvPr id="149" name="Verifique la precisión…"/>
           <p:cNvSpPr txBox="1">
             <a:spLocks noGrp="1"/>
           </p:cNvSpPr>
           <p:nvPr>
-            <p:ph type="body" idx="1"/>
+            <p:ph type="body" sz="half" idx="1"/>
           </p:nvPr>
         </p:nvSpPr>
         <p:spPr>
           <a:xfrm>
-            <a:off x="838200" y="1825625"/>
-            <a:ext cx="10515600" cy="4883132"/>
+            <a:off x="6791676" y="2028522"/>
+            <a:ext cx="5264183" cy="4048404"/>
           </a:xfrm>
           <a:prstGeom prst="rect">
             <a:avLst/>
@@ -4119,112 +5038,1009 @@
           <a:bodyPr/>
           <a:lstStyle/>
           <a:p>
-            <a:pPr>
-              <a:defRPr i="1">
-                <a:solidFill>
-                  <a:schemeClr val="accent3">
-                    <a:lumOff val="-12941"/>
-                  </a:schemeClr>
-                </a:solidFill>
+            <a:pPr marL="457200" indent="-317500" defTabSz="457200">
+              <a:lnSpc>
+                <a:spcPct val="100000"/>
+              </a:lnSpc>
+              <a:spcBef>
+                <a:spcPts val="0"/>
+              </a:spcBef>
+              <a:buClr>
+                <a:srgbClr val="1F2328"/>
+              </a:buClr>
+              <a:buFont typeface="TimesNewRomanPSMT"/>
+              <a:buAutoNum type="arabicPeriod"/>
+              <a:defRPr sz="2600">
+                <a:solidFill>
+                  <a:srgbClr val="1F2328"/>
+                </a:solidFill>
+                <a:latin typeface="Helvetica Neue"/>
+                <a:ea typeface="Helvetica Neue"/>
+                <a:cs typeface="Helvetica Neue"/>
+                <a:sym typeface="Helvetica Neue"/>
               </a:defRPr>
             </a:pPr>
             <a:r>
-              <a:t>("AI tools" OR "GPT tools" OR "AI resources" OR "AI catalog" OR "AI list" OR "AI repository" OR "generative AI") ("list" OR "collection" OR "catalog" OR "repository" OR "guide") </a:t>
-            </a:r>
-          </a:p>
-          <a:p>
-            <a:r>
-              <a:t>Herramienta de lista maestra de IA - </a:t>
-            </a:r>
-            <a:r>
-              <a:rPr u="sng">
-                <a:solidFill>
-                  <a:srgbClr val="0563C1"/>
-                </a:solidFill>
-                <a:uFill>
-                  <a:solidFill>
-                    <a:srgbClr val="0563C1"/>
-                  </a:solidFill>
-                </a:uFill>
-                <a:hlinkClick r:id="rId2"/>
-              </a:rPr>
-              <a:t>https://doc.clickup.com/25598832/d/h/rd6vg-14247/0b79ca1dc0f7429/rd6vg-12207</a:t>
-            </a:r>
-            <a:r>
+              <a:rPr b="1" dirty="0" err="1">
+                <a:solidFill>
+                  <a:schemeClr val="tx1"/>
+                </a:solidFill>
+                <a:highlight>
+                  <a:srgbClr val="000000"/>
+                </a:highlight>
+                <a:latin typeface="+mn-lt"/>
+                <a:ea typeface="+mn-ea"/>
+                <a:cs typeface="+mn-cs"/>
+                <a:sym typeface="Helvetica"/>
+              </a:rPr>
+              <a:t>Verifique</a:t>
+            </a:r>
+            <a:r>
+              <a:rPr b="1" dirty="0">
+                <a:solidFill>
+                  <a:schemeClr val="tx1"/>
+                </a:solidFill>
+                <a:highlight>
+                  <a:srgbClr val="000000"/>
+                </a:highlight>
+                <a:latin typeface="+mn-lt"/>
+                <a:ea typeface="+mn-ea"/>
+                <a:cs typeface="+mn-cs"/>
+                <a:sym typeface="Helvetica"/>
+              </a:rPr>
+              <a:t> la </a:t>
+            </a:r>
+            <a:r>
+              <a:rPr b="1" dirty="0" err="1">
+                <a:solidFill>
+                  <a:schemeClr val="tx1"/>
+                </a:solidFill>
+                <a:highlight>
+                  <a:srgbClr val="000000"/>
+                </a:highlight>
+                <a:latin typeface="+mn-lt"/>
+                <a:ea typeface="+mn-ea"/>
+                <a:cs typeface="+mn-cs"/>
+                <a:sym typeface="Helvetica"/>
+              </a:rPr>
+              <a:t>precisión</a:t>
+            </a:r>
+            <a:endParaRPr dirty="0">
+              <a:solidFill>
+                <a:schemeClr val="tx1"/>
+              </a:solidFill>
+              <a:highlight>
+                <a:srgbClr val="000000"/>
+              </a:highlight>
+              <a:latin typeface="+mn-lt"/>
+              <a:ea typeface="+mn-ea"/>
+              <a:cs typeface="+mn-cs"/>
+              <a:sym typeface="Helvetica"/>
+            </a:endParaRPr>
+          </a:p>
+          <a:p>
+            <a:pPr marL="457200" indent="-317500" defTabSz="457200">
+              <a:lnSpc>
+                <a:spcPct val="100000"/>
+              </a:lnSpc>
+              <a:spcBef>
+                <a:spcPts val="0"/>
+              </a:spcBef>
+              <a:buClr>
+                <a:srgbClr val="1F2328"/>
+              </a:buClr>
+              <a:buFont typeface="TimesNewRomanPSMT"/>
+              <a:buAutoNum type="arabicPeriod"/>
+              <a:defRPr sz="2600">
+                <a:solidFill>
+                  <a:srgbClr val="0433FF"/>
+                </a:solidFill>
+                <a:latin typeface="Helvetica Neue"/>
+                <a:ea typeface="Helvetica Neue"/>
+                <a:cs typeface="Helvetica Neue"/>
+                <a:sym typeface="Helvetica Neue"/>
+              </a:defRPr>
+            </a:pPr>
+            <a:r>
+              <a:rPr b="1" dirty="0">
+                <a:solidFill>
+                  <a:schemeClr val="tx1"/>
+                </a:solidFill>
+                <a:highlight>
+                  <a:srgbClr val="000000"/>
+                </a:highlight>
+                <a:latin typeface="+mn-lt"/>
+                <a:ea typeface="+mn-ea"/>
+                <a:cs typeface="+mn-cs"/>
+                <a:sym typeface="Helvetica"/>
+              </a:rPr>
+              <a:t>Sea </a:t>
+            </a:r>
+            <a:r>
+              <a:rPr b="1" dirty="0" err="1">
+                <a:solidFill>
+                  <a:schemeClr val="tx1"/>
+                </a:solidFill>
+                <a:highlight>
+                  <a:srgbClr val="000000"/>
+                </a:highlight>
+                <a:latin typeface="+mn-lt"/>
+                <a:ea typeface="+mn-ea"/>
+                <a:cs typeface="+mn-cs"/>
+                <a:sym typeface="Helvetica"/>
+              </a:rPr>
+              <a:t>específico</a:t>
+            </a:r>
+            <a:endParaRPr b="1" dirty="0">
+              <a:solidFill>
+                <a:schemeClr val="tx1"/>
+              </a:solidFill>
+              <a:highlight>
+                <a:srgbClr val="000000"/>
+              </a:highlight>
+              <a:latin typeface="+mn-lt"/>
+              <a:ea typeface="+mn-ea"/>
+              <a:cs typeface="+mn-cs"/>
+              <a:sym typeface="Helvetica"/>
+            </a:endParaRPr>
+          </a:p>
+          <a:p>
+            <a:pPr marL="457200" indent="-317500" defTabSz="457200">
+              <a:lnSpc>
+                <a:spcPct val="100000"/>
+              </a:lnSpc>
+              <a:spcBef>
+                <a:spcPts val="0"/>
+              </a:spcBef>
+              <a:buClr>
+                <a:srgbClr val="1F2328"/>
+              </a:buClr>
+              <a:buFont typeface="TimesNewRomanPSMT"/>
+              <a:buAutoNum type="arabicPeriod"/>
+              <a:defRPr sz="2600">
+                <a:solidFill>
+                  <a:srgbClr val="FF9300"/>
+                </a:solidFill>
+                <a:latin typeface="Helvetica Neue"/>
+                <a:ea typeface="Helvetica Neue"/>
+                <a:cs typeface="Helvetica Neue"/>
+                <a:sym typeface="Helvetica Neue"/>
+              </a:defRPr>
+            </a:pPr>
+            <a:r>
+              <a:rPr b="1" dirty="0" err="1">
+                <a:solidFill>
+                  <a:schemeClr val="tx1"/>
+                </a:solidFill>
+                <a:highlight>
+                  <a:srgbClr val="000000"/>
+                </a:highlight>
+                <a:latin typeface="+mn-lt"/>
+                <a:ea typeface="+mn-ea"/>
+                <a:cs typeface="+mn-cs"/>
+                <a:sym typeface="Helvetica"/>
+              </a:rPr>
+              <a:t>Iterar</a:t>
+            </a:r>
+            <a:r>
+              <a:rPr b="1" dirty="0">
+                <a:solidFill>
+                  <a:schemeClr val="tx1"/>
+                </a:solidFill>
+                <a:highlight>
+                  <a:srgbClr val="000000"/>
+                </a:highlight>
+                <a:latin typeface="+mn-lt"/>
+                <a:ea typeface="+mn-ea"/>
+                <a:cs typeface="+mn-cs"/>
+                <a:sym typeface="Helvetica"/>
+              </a:rPr>
+              <a:t> y </a:t>
+            </a:r>
+            <a:r>
+              <a:rPr b="1" dirty="0" err="1">
+                <a:solidFill>
+                  <a:schemeClr val="tx1"/>
+                </a:solidFill>
+                <a:highlight>
+                  <a:srgbClr val="000000"/>
+                </a:highlight>
+                <a:latin typeface="+mn-lt"/>
+                <a:ea typeface="+mn-ea"/>
+                <a:cs typeface="+mn-cs"/>
+                <a:sym typeface="Helvetica"/>
+              </a:rPr>
+              <a:t>refinar</a:t>
+            </a:r>
+            <a:endParaRPr b="1" dirty="0">
+              <a:solidFill>
+                <a:schemeClr val="tx1"/>
+              </a:solidFill>
+              <a:highlight>
+                <a:srgbClr val="000000"/>
+              </a:highlight>
+              <a:latin typeface="+mn-lt"/>
+              <a:ea typeface="+mn-ea"/>
+              <a:cs typeface="+mn-cs"/>
+              <a:sym typeface="Helvetica"/>
+            </a:endParaRPr>
+          </a:p>
+          <a:p>
+            <a:pPr marL="457200" indent="-317500" defTabSz="457200">
+              <a:lnSpc>
+                <a:spcPct val="100000"/>
+              </a:lnSpc>
+              <a:spcBef>
+                <a:spcPts val="0"/>
+              </a:spcBef>
+              <a:buClr>
+                <a:srgbClr val="1F2328"/>
+              </a:buClr>
+              <a:buFont typeface="TimesNewRomanPSMT"/>
+              <a:buAutoNum type="arabicPeriod"/>
+              <a:defRPr sz="2600">
+                <a:solidFill>
+                  <a:srgbClr val="FF40FF"/>
+                </a:solidFill>
+                <a:latin typeface="Helvetica Neue"/>
+                <a:ea typeface="Helvetica Neue"/>
+                <a:cs typeface="Helvetica Neue"/>
+                <a:sym typeface="Helvetica Neue"/>
+              </a:defRPr>
+            </a:pPr>
+            <a:r>
+              <a:rPr b="1" dirty="0" err="1">
+                <a:solidFill>
+                  <a:schemeClr val="tx1"/>
+                </a:solidFill>
+                <a:highlight>
+                  <a:srgbClr val="000000"/>
+                </a:highlight>
+                <a:latin typeface="+mn-lt"/>
+                <a:ea typeface="+mn-ea"/>
+                <a:cs typeface="+mn-cs"/>
+                <a:sym typeface="Helvetica"/>
+              </a:rPr>
+              <a:t>Proporcionar</a:t>
+            </a:r>
+            <a:r>
+              <a:rPr b="1" dirty="0">
+                <a:solidFill>
+                  <a:schemeClr val="tx1"/>
+                </a:solidFill>
+                <a:highlight>
+                  <a:srgbClr val="000000"/>
+                </a:highlight>
+                <a:latin typeface="+mn-lt"/>
+                <a:ea typeface="+mn-ea"/>
+                <a:cs typeface="+mn-cs"/>
+                <a:sym typeface="Helvetica"/>
+              </a:rPr>
               <a:t> </a:t>
             </a:r>
-          </a:p>
-          <a:p>
-            <a:r>
-              <a:t>Repositorio de catálogos de IA - </a:t>
-            </a:r>
-            <a:r>
-              <a:rPr u="sng">
-                <a:solidFill>
-                  <a:srgbClr val="0563C1"/>
-                </a:solidFill>
-                <a:uFill>
-                  <a:solidFill>
-                    <a:srgbClr val="0563C1"/>
-                  </a:solidFill>
-                </a:uFill>
-                <a:hlinkClick r:id="rId3"/>
-              </a:rPr>
-              <a:t>https://github.com/mehmetkahya0/ai-catalog</a:t>
-            </a:r>
-            <a:r>
+            <a:r>
+              <a:rPr b="1" dirty="0" err="1">
+                <a:solidFill>
+                  <a:schemeClr val="tx1"/>
+                </a:solidFill>
+                <a:highlight>
+                  <a:srgbClr val="000000"/>
+                </a:highlight>
+                <a:latin typeface="+mn-lt"/>
+                <a:ea typeface="+mn-ea"/>
+                <a:cs typeface="+mn-cs"/>
+                <a:sym typeface="Helvetica"/>
+              </a:rPr>
+              <a:t>contexto</a:t>
+            </a:r>
+            <a:endParaRPr b="1" dirty="0">
+              <a:solidFill>
+                <a:schemeClr val="tx1"/>
+              </a:solidFill>
+              <a:highlight>
+                <a:srgbClr val="000000"/>
+              </a:highlight>
+              <a:latin typeface="+mn-lt"/>
+              <a:ea typeface="+mn-ea"/>
+              <a:cs typeface="+mn-cs"/>
+              <a:sym typeface="Helvetica"/>
+            </a:endParaRPr>
+          </a:p>
+          <a:p>
+            <a:pPr marL="457200" indent="-317500" defTabSz="457200">
+              <a:lnSpc>
+                <a:spcPct val="100000"/>
+              </a:lnSpc>
+              <a:spcBef>
+                <a:spcPts val="0"/>
+              </a:spcBef>
+              <a:buClr>
+                <a:srgbClr val="1F2328"/>
+              </a:buClr>
+              <a:buFont typeface="TimesNewRomanPSMT"/>
+              <a:buAutoNum type="arabicPeriod"/>
+              <a:defRPr sz="2600">
+                <a:solidFill>
+                  <a:srgbClr val="1F2328"/>
+                </a:solidFill>
+                <a:latin typeface="Helvetica Neue"/>
+                <a:ea typeface="Helvetica Neue"/>
+                <a:cs typeface="Helvetica Neue"/>
+                <a:sym typeface="Helvetica Neue"/>
+              </a:defRPr>
+            </a:pPr>
+            <a:r>
+              <a:rPr b="1" dirty="0" err="1">
+                <a:solidFill>
+                  <a:schemeClr val="tx1"/>
+                </a:solidFill>
+                <a:highlight>
+                  <a:srgbClr val="000000"/>
+                </a:highlight>
+                <a:latin typeface="+mn-lt"/>
+                <a:ea typeface="+mn-ea"/>
+                <a:cs typeface="+mn-cs"/>
+                <a:sym typeface="Helvetica"/>
+              </a:rPr>
+              <a:t>Utilice</a:t>
+            </a:r>
+            <a:r>
+              <a:rPr b="1" dirty="0">
+                <a:solidFill>
+                  <a:schemeClr val="tx1"/>
+                </a:solidFill>
+                <a:highlight>
+                  <a:srgbClr val="000000"/>
+                </a:highlight>
+                <a:latin typeface="+mn-lt"/>
+                <a:ea typeface="+mn-ea"/>
+                <a:cs typeface="+mn-cs"/>
+                <a:sym typeface="Helvetica"/>
+              </a:rPr>
               <a:t> </a:t>
             </a:r>
-          </a:p>
-          <a:p>
-            <a:r>
-              <a:t>Impresionante IA generativa - </a:t>
-            </a:r>
-            <a:r>
-              <a:rPr u="sng">
-                <a:solidFill>
-                  <a:srgbClr val="0563C1"/>
-                </a:solidFill>
-                <a:uFill>
-                  <a:solidFill>
-                    <a:srgbClr val="0563C1"/>
-                  </a:solidFill>
-                </a:uFill>
-                <a:hlinkClick r:id="rId4"/>
-              </a:rPr>
-              <a:t>https://github.com/amusi/awesome-ai-awesomeness</a:t>
-            </a:r>
-            <a:r>
+            <a:r>
+              <a:rPr b="1" dirty="0" err="1">
+                <a:solidFill>
+                  <a:schemeClr val="tx1"/>
+                </a:solidFill>
+                <a:highlight>
+                  <a:srgbClr val="000000"/>
+                </a:highlight>
+                <a:latin typeface="+mn-lt"/>
+                <a:ea typeface="+mn-ea"/>
+                <a:cs typeface="+mn-cs"/>
+                <a:sym typeface="Helvetica"/>
+              </a:rPr>
+              <a:t>múltiples</a:t>
+            </a:r>
+            <a:r>
+              <a:rPr b="1" dirty="0">
+                <a:solidFill>
+                  <a:schemeClr val="tx1"/>
+                </a:solidFill>
+                <a:highlight>
+                  <a:srgbClr val="000000"/>
+                </a:highlight>
+                <a:latin typeface="+mn-lt"/>
+                <a:ea typeface="+mn-ea"/>
+                <a:cs typeface="+mn-cs"/>
+                <a:sym typeface="Helvetica"/>
+              </a:rPr>
               <a:t> </a:t>
             </a:r>
-          </a:p>
-          <a:p>
-            <a:r>
-              <a:t>FutureTools - </a:t>
-            </a:r>
-            <a:r>
-              <a:rPr u="sng">
-                <a:solidFill>
-                  <a:srgbClr val="0563C1"/>
-                </a:solidFill>
-                <a:uFill>
-                  <a:solidFill>
-                    <a:srgbClr val="0563C1"/>
-                  </a:solidFill>
-                </a:uFill>
-                <a:hlinkClick r:id="rId5"/>
-              </a:rPr>
-              <a:t>https://futuretools.io</a:t>
-            </a:r>
-            <a:r>
+            <a:r>
+              <a:rPr b="1" dirty="0" err="1">
+                <a:solidFill>
+                  <a:schemeClr val="tx1"/>
+                </a:solidFill>
+                <a:highlight>
+                  <a:srgbClr val="000000"/>
+                </a:highlight>
+                <a:latin typeface="+mn-lt"/>
+                <a:ea typeface="+mn-ea"/>
+                <a:cs typeface="+mn-cs"/>
+                <a:sym typeface="Helvetica"/>
+              </a:rPr>
+              <a:t>servicios</a:t>
+            </a:r>
+            <a:endParaRPr b="1" dirty="0">
+              <a:solidFill>
+                <a:schemeClr val="tx1"/>
+              </a:solidFill>
+              <a:highlight>
+                <a:srgbClr val="000000"/>
+              </a:highlight>
+              <a:latin typeface="+mn-lt"/>
+              <a:ea typeface="+mn-ea"/>
+              <a:cs typeface="+mn-cs"/>
+              <a:sym typeface="Helvetica"/>
+            </a:endParaRPr>
+          </a:p>
+          <a:p>
+            <a:pPr marL="457200" indent="-317500" defTabSz="457200">
+              <a:lnSpc>
+                <a:spcPct val="100000"/>
+              </a:lnSpc>
+              <a:spcBef>
+                <a:spcPts val="0"/>
+              </a:spcBef>
+              <a:buClr>
+                <a:srgbClr val="1F2328"/>
+              </a:buClr>
+              <a:buFont typeface="TimesNewRomanPSMT"/>
+              <a:buAutoNum type="arabicPeriod"/>
+              <a:defRPr sz="2600">
+                <a:solidFill>
+                  <a:srgbClr val="942192"/>
+                </a:solidFill>
+                <a:latin typeface="Helvetica Neue"/>
+                <a:ea typeface="Helvetica Neue"/>
+                <a:cs typeface="Helvetica Neue"/>
+                <a:sym typeface="Helvetica Neue"/>
+              </a:defRPr>
+            </a:pPr>
+            <a:r>
+              <a:rPr b="1" dirty="0" err="1">
+                <a:solidFill>
+                  <a:schemeClr val="tx1"/>
+                </a:solidFill>
+                <a:highlight>
+                  <a:srgbClr val="000000"/>
+                </a:highlight>
+                <a:latin typeface="+mn-lt"/>
+                <a:ea typeface="+mn-ea"/>
+                <a:cs typeface="+mn-cs"/>
+                <a:sym typeface="Helvetica"/>
+              </a:rPr>
+              <a:t>Recuerde</a:t>
+            </a:r>
+            <a:r>
+              <a:rPr b="1" dirty="0">
+                <a:solidFill>
+                  <a:schemeClr val="tx1"/>
+                </a:solidFill>
+                <a:highlight>
+                  <a:srgbClr val="000000"/>
+                </a:highlight>
+                <a:latin typeface="+mn-lt"/>
+                <a:ea typeface="+mn-ea"/>
+                <a:cs typeface="+mn-cs"/>
+                <a:sym typeface="Helvetica"/>
+              </a:rPr>
+              <a:t> de las </a:t>
+            </a:r>
+            <a:r>
+              <a:rPr b="1" dirty="0" err="1">
+                <a:solidFill>
+                  <a:schemeClr val="tx1"/>
+                </a:solidFill>
+                <a:highlight>
+                  <a:srgbClr val="000000"/>
+                </a:highlight>
+                <a:latin typeface="+mn-lt"/>
+                <a:ea typeface="+mn-ea"/>
+                <a:cs typeface="+mn-cs"/>
+                <a:sym typeface="Helvetica"/>
+              </a:rPr>
+              <a:t>restricciones</a:t>
+            </a:r>
+            <a:endParaRPr b="1" dirty="0">
+              <a:solidFill>
+                <a:schemeClr val="tx1"/>
+              </a:solidFill>
+              <a:highlight>
+                <a:srgbClr val="000000"/>
+              </a:highlight>
+              <a:latin typeface="+mn-lt"/>
+              <a:ea typeface="+mn-ea"/>
+              <a:cs typeface="+mn-cs"/>
+              <a:sym typeface="Helvetica"/>
+            </a:endParaRPr>
+          </a:p>
+          <a:p>
+            <a:pPr marL="457200" indent="-317500" defTabSz="457200">
+              <a:lnSpc>
+                <a:spcPct val="100000"/>
+              </a:lnSpc>
+              <a:spcBef>
+                <a:spcPts val="0"/>
+              </a:spcBef>
+              <a:buClr>
+                <a:srgbClr val="1F2328"/>
+              </a:buClr>
+              <a:buFont typeface="TimesNewRomanPSMT"/>
+              <a:buAutoNum type="arabicPeriod"/>
+              <a:defRPr sz="2600">
+                <a:solidFill>
+                  <a:srgbClr val="1F2328"/>
+                </a:solidFill>
+                <a:latin typeface="Helvetica Neue"/>
+                <a:ea typeface="Helvetica Neue"/>
+                <a:cs typeface="Helvetica Neue"/>
+                <a:sym typeface="Helvetica Neue"/>
+              </a:defRPr>
+            </a:pPr>
+            <a:r>
+              <a:rPr b="1" dirty="0" err="1">
+                <a:solidFill>
+                  <a:schemeClr val="tx1"/>
+                </a:solidFill>
+                <a:highlight>
+                  <a:srgbClr val="000000"/>
+                </a:highlight>
+                <a:latin typeface="+mn-lt"/>
+                <a:ea typeface="+mn-ea"/>
+                <a:cs typeface="+mn-cs"/>
+                <a:sym typeface="Helvetica"/>
+              </a:rPr>
+              <a:t>Crear</a:t>
+            </a:r>
+            <a:r>
+              <a:rPr b="1" dirty="0">
+                <a:solidFill>
+                  <a:schemeClr val="tx1"/>
+                </a:solidFill>
+                <a:highlight>
+                  <a:srgbClr val="000000"/>
+                </a:highlight>
+                <a:latin typeface="+mn-lt"/>
+                <a:ea typeface="+mn-ea"/>
+                <a:cs typeface="+mn-cs"/>
+                <a:sym typeface="Helvetica"/>
+              </a:rPr>
               <a:t> </a:t>
             </a:r>
+            <a:r>
+              <a:rPr b="1" dirty="0" err="1">
+                <a:solidFill>
+                  <a:schemeClr val="tx1"/>
+                </a:solidFill>
+                <a:highlight>
+                  <a:srgbClr val="000000"/>
+                </a:highlight>
+                <a:latin typeface="+mn-lt"/>
+                <a:ea typeface="+mn-ea"/>
+                <a:cs typeface="+mn-cs"/>
+                <a:sym typeface="Helvetica"/>
+              </a:rPr>
+              <a:t>plantillas</a:t>
+            </a:r>
+            <a:endParaRPr b="1" dirty="0">
+              <a:solidFill>
+                <a:schemeClr val="tx1"/>
+              </a:solidFill>
+              <a:highlight>
+                <a:srgbClr val="000000"/>
+              </a:highlight>
+              <a:latin typeface="+mn-lt"/>
+              <a:ea typeface="+mn-ea"/>
+              <a:cs typeface="+mn-cs"/>
+              <a:sym typeface="Helvetica"/>
+            </a:endParaRPr>
           </a:p>
         </p:txBody>
       </p:sp>
       <p:sp>
         <p:nvSpPr>
-          <p:cNvPr id="183" name="Slide Number"/>
+          <p:cNvPr id="150" name="Content Placeholder 2"/>
+          <p:cNvSpPr txBox="1"/>
+          <p:nvPr/>
+        </p:nvSpPr>
+        <p:spPr>
+          <a:xfrm>
+            <a:off x="19327" y="2028522"/>
+            <a:ext cx="4609515" cy="4351339"/>
+          </a:xfrm>
+          <a:prstGeom prst="rect">
+            <a:avLst/>
+          </a:prstGeom>
+          <a:ln w="12700">
+            <a:miter lim="400000"/>
+          </a:ln>
+          <a:extLst>
+            <a:ext uri="{C572A759-6A51-4108-AA02-DFA0A04FC94B}">
+              <ma14:wrappingTextBoxFlag xmlns="" xmlns:m="http://schemas.openxmlformats.org/officeDocument/2006/math" xmlns:a14="http://schemas.microsoft.com/office/drawing/2010/main" xmlns:ma14="http://schemas.microsoft.com/office/mac/drawingml/2011/main" val="1"/>
+            </a:ext>
+          </a:extLst>
+        </p:spPr>
+        <p:txBody>
+          <a:bodyPr lIns="45719" rIns="45719">
+            <a:normAutofit/>
+          </a:bodyPr>
+          <a:lstStyle/>
+          <a:p>
+            <a:pPr marL="457200" indent="-317500" defTabSz="457200">
+              <a:buClr>
+                <a:srgbClr val="1F2328"/>
+              </a:buClr>
+              <a:buSzPct val="100000"/>
+              <a:buFont typeface="TimesNewRomanPSMT"/>
+              <a:buAutoNum type="arabicPeriod"/>
+              <a:defRPr sz="2600">
+                <a:solidFill>
+                  <a:srgbClr val="1F2328"/>
+                </a:solidFill>
+                <a:latin typeface="Helvetica Neue"/>
+                <a:ea typeface="Helvetica Neue"/>
+                <a:cs typeface="Helvetica Neue"/>
+                <a:sym typeface="Helvetica Neue"/>
+              </a:defRPr>
+            </a:pPr>
+            <a:r>
+              <a:rPr b="1" dirty="0">
+                <a:solidFill>
+                  <a:schemeClr val="tx1"/>
+                </a:solidFill>
+                <a:highlight>
+                  <a:srgbClr val="000000"/>
+                </a:highlight>
+                <a:latin typeface="+mn-lt"/>
+                <a:ea typeface="+mn-ea"/>
+                <a:cs typeface="+mn-cs"/>
+                <a:sym typeface="Helvetica"/>
+              </a:rPr>
+              <a:t>Check for Accuracy</a:t>
+            </a:r>
+          </a:p>
+          <a:p>
+            <a:pPr marL="457200" indent="-317500" defTabSz="457200">
+              <a:buClr>
+                <a:srgbClr val="1F2328"/>
+              </a:buClr>
+              <a:buSzPct val="100000"/>
+              <a:buFont typeface="TimesNewRomanPSMT"/>
+              <a:buAutoNum type="arabicPeriod"/>
+              <a:defRPr sz="2600">
+                <a:solidFill>
+                  <a:srgbClr val="0433FF"/>
+                </a:solidFill>
+                <a:latin typeface="Helvetica Neue"/>
+                <a:ea typeface="Helvetica Neue"/>
+                <a:cs typeface="Helvetica Neue"/>
+                <a:sym typeface="Helvetica Neue"/>
+              </a:defRPr>
+            </a:pPr>
+            <a:r>
+              <a:rPr b="1" dirty="0">
+                <a:solidFill>
+                  <a:schemeClr val="tx1"/>
+                </a:solidFill>
+                <a:highlight>
+                  <a:srgbClr val="000000"/>
+                </a:highlight>
+                <a:latin typeface="+mn-lt"/>
+                <a:ea typeface="+mn-ea"/>
+                <a:cs typeface="+mn-cs"/>
+                <a:sym typeface="Helvetica"/>
+              </a:rPr>
+              <a:t>Be Specific</a:t>
+            </a:r>
+            <a:r>
+              <a:rPr dirty="0">
+                <a:solidFill>
+                  <a:schemeClr val="tx1"/>
+                </a:solidFill>
+                <a:highlight>
+                  <a:srgbClr val="000000"/>
+                </a:highlight>
+              </a:rPr>
+              <a:t>: </a:t>
+            </a:r>
+          </a:p>
+          <a:p>
+            <a:pPr marL="457200" indent="-317500" defTabSz="457200">
+              <a:buClr>
+                <a:srgbClr val="1F2328"/>
+              </a:buClr>
+              <a:buSzPct val="100000"/>
+              <a:buFont typeface="TimesNewRomanPSMT"/>
+              <a:buAutoNum type="arabicPeriod"/>
+              <a:defRPr sz="2600">
+                <a:solidFill>
+                  <a:srgbClr val="FF9300"/>
+                </a:solidFill>
+                <a:latin typeface="Helvetica Neue"/>
+                <a:ea typeface="Helvetica Neue"/>
+                <a:cs typeface="Helvetica Neue"/>
+                <a:sym typeface="Helvetica Neue"/>
+              </a:defRPr>
+            </a:pPr>
+            <a:r>
+              <a:rPr b="1" dirty="0">
+                <a:solidFill>
+                  <a:schemeClr val="tx1"/>
+                </a:solidFill>
+                <a:highlight>
+                  <a:srgbClr val="000000"/>
+                </a:highlight>
+                <a:latin typeface="+mn-lt"/>
+                <a:ea typeface="+mn-ea"/>
+                <a:cs typeface="+mn-cs"/>
+                <a:sym typeface="Helvetica"/>
+              </a:rPr>
+              <a:t>Iterate and Refine</a:t>
+            </a:r>
+            <a:r>
+              <a:rPr dirty="0">
+                <a:solidFill>
+                  <a:schemeClr val="tx1"/>
+                </a:solidFill>
+                <a:highlight>
+                  <a:srgbClr val="000000"/>
+                </a:highlight>
+              </a:rPr>
+              <a:t>: </a:t>
+            </a:r>
+          </a:p>
+          <a:p>
+            <a:pPr marL="457200" indent="-317500" defTabSz="457200">
+              <a:buClr>
+                <a:srgbClr val="1F2328"/>
+              </a:buClr>
+              <a:buSzPct val="100000"/>
+              <a:buFont typeface="TimesNewRomanPSMT"/>
+              <a:buAutoNum type="arabicPeriod"/>
+              <a:defRPr sz="2600">
+                <a:solidFill>
+                  <a:srgbClr val="FF40FF"/>
+                </a:solidFill>
+                <a:latin typeface="Helvetica Neue"/>
+                <a:ea typeface="Helvetica Neue"/>
+                <a:cs typeface="Helvetica Neue"/>
+                <a:sym typeface="Helvetica Neue"/>
+              </a:defRPr>
+            </a:pPr>
+            <a:r>
+              <a:rPr b="1" dirty="0">
+                <a:solidFill>
+                  <a:schemeClr val="tx1"/>
+                </a:solidFill>
+                <a:highlight>
+                  <a:srgbClr val="000000"/>
+                </a:highlight>
+                <a:latin typeface="+mn-lt"/>
+                <a:ea typeface="+mn-ea"/>
+                <a:cs typeface="+mn-cs"/>
+                <a:sym typeface="Helvetica"/>
+              </a:rPr>
+              <a:t>Provide Context</a:t>
+            </a:r>
+            <a:r>
+              <a:rPr dirty="0">
+                <a:solidFill>
+                  <a:schemeClr val="tx1"/>
+                </a:solidFill>
+                <a:highlight>
+                  <a:srgbClr val="000000"/>
+                </a:highlight>
+              </a:rPr>
+              <a:t>:</a:t>
+            </a:r>
+          </a:p>
+          <a:p>
+            <a:pPr marL="457200" indent="-317500" defTabSz="457200">
+              <a:buClr>
+                <a:srgbClr val="1F2328"/>
+              </a:buClr>
+              <a:buSzPct val="100000"/>
+              <a:buFont typeface="TimesNewRomanPSMT"/>
+              <a:buAutoNum type="arabicPeriod"/>
+              <a:defRPr sz="2600">
+                <a:solidFill>
+                  <a:srgbClr val="1F2328"/>
+                </a:solidFill>
+                <a:latin typeface="Helvetica Neue"/>
+                <a:ea typeface="Helvetica Neue"/>
+                <a:cs typeface="Helvetica Neue"/>
+                <a:sym typeface="Helvetica Neue"/>
+              </a:defRPr>
+            </a:pPr>
+            <a:r>
+              <a:rPr b="1" dirty="0">
+                <a:solidFill>
+                  <a:schemeClr val="tx1"/>
+                </a:solidFill>
+                <a:highlight>
+                  <a:srgbClr val="000000"/>
+                </a:highlight>
+                <a:latin typeface="+mn-lt"/>
+                <a:ea typeface="+mn-ea"/>
+                <a:cs typeface="+mn-cs"/>
+                <a:sym typeface="Helvetica"/>
+              </a:rPr>
+              <a:t>Use Multiple Services</a:t>
+            </a:r>
+            <a:r>
+              <a:rPr dirty="0">
+                <a:solidFill>
+                  <a:schemeClr val="tx1"/>
+                </a:solidFill>
+                <a:highlight>
+                  <a:srgbClr val="000000"/>
+                </a:highlight>
+              </a:rPr>
+              <a:t>:</a:t>
+            </a:r>
+          </a:p>
+          <a:p>
+            <a:pPr marL="457200" indent="-317500" defTabSz="457200">
+              <a:buClr>
+                <a:srgbClr val="1F2328"/>
+              </a:buClr>
+              <a:buSzPct val="100000"/>
+              <a:buFont typeface="TimesNewRomanPSMT"/>
+              <a:buAutoNum type="arabicPeriod"/>
+              <a:defRPr sz="2600">
+                <a:solidFill>
+                  <a:srgbClr val="942192"/>
+                </a:solidFill>
+                <a:latin typeface="Helvetica Neue"/>
+                <a:ea typeface="Helvetica Neue"/>
+                <a:cs typeface="Helvetica Neue"/>
+                <a:sym typeface="Helvetica Neue"/>
+              </a:defRPr>
+            </a:pPr>
+            <a:r>
+              <a:rPr b="1" dirty="0">
+                <a:solidFill>
+                  <a:schemeClr val="tx1"/>
+                </a:solidFill>
+                <a:highlight>
+                  <a:srgbClr val="000000"/>
+                </a:highlight>
+                <a:latin typeface="+mn-lt"/>
+                <a:ea typeface="+mn-ea"/>
+                <a:cs typeface="+mn-cs"/>
+                <a:sym typeface="Helvetica"/>
+              </a:rPr>
+              <a:t>Remind AI of Constraints</a:t>
+            </a:r>
+            <a:r>
+              <a:rPr dirty="0">
+                <a:solidFill>
+                  <a:schemeClr val="tx1"/>
+                </a:solidFill>
+                <a:highlight>
+                  <a:srgbClr val="000000"/>
+                </a:highlight>
+              </a:rPr>
+              <a:t>:</a:t>
+            </a:r>
+          </a:p>
+          <a:p>
+            <a:pPr marL="457200" indent="-317500" defTabSz="457200">
+              <a:buClr>
+                <a:srgbClr val="1F2328"/>
+              </a:buClr>
+              <a:buSzPct val="100000"/>
+              <a:buFont typeface="TimesNewRomanPSMT"/>
+              <a:buAutoNum type="arabicPeriod"/>
+              <a:defRPr sz="2600">
+                <a:solidFill>
+                  <a:srgbClr val="1F2328"/>
+                </a:solidFill>
+                <a:latin typeface="Helvetica Neue"/>
+                <a:ea typeface="Helvetica Neue"/>
+                <a:cs typeface="Helvetica Neue"/>
+                <a:sym typeface="Helvetica Neue"/>
+              </a:defRPr>
+            </a:pPr>
+            <a:r>
+              <a:rPr b="1" dirty="0">
+                <a:solidFill>
+                  <a:schemeClr val="tx1"/>
+                </a:solidFill>
+                <a:highlight>
+                  <a:srgbClr val="000000"/>
+                </a:highlight>
+                <a:latin typeface="+mn-lt"/>
+                <a:ea typeface="+mn-ea"/>
+                <a:cs typeface="+mn-cs"/>
+                <a:sym typeface="Helvetica"/>
+              </a:rPr>
+              <a:t>Make Templates</a:t>
+            </a:r>
+            <a:r>
+              <a:rPr dirty="0">
+                <a:solidFill>
+                  <a:schemeClr val="tx1"/>
+                </a:solidFill>
+                <a:highlight>
+                  <a:srgbClr val="000000"/>
+                </a:highlight>
+              </a:rPr>
+              <a:t>:</a:t>
+            </a:r>
+          </a:p>
+        </p:txBody>
+      </p:sp>
+      <p:sp>
+        <p:nvSpPr>
+          <p:cNvPr id="151" name="Text"/>
+          <p:cNvSpPr txBox="1"/>
+          <p:nvPr/>
+        </p:nvSpPr>
+        <p:spPr>
+          <a:xfrm>
+            <a:off x="11172418" y="6414760"/>
+            <a:ext cx="181382" cy="248305"/>
+          </a:xfrm>
+          <a:prstGeom prst="rect">
+            <a:avLst/>
+          </a:prstGeom>
+          <a:ln w="12700">
+            <a:miter lim="400000"/>
+          </a:ln>
+          <a:extLst>
+            <a:ext uri="{C572A759-6A51-4108-AA02-DFA0A04FC94B}">
+              <ma14:wrappingTextBoxFlag xmlns="" xmlns:m="http://schemas.openxmlformats.org/officeDocument/2006/math" xmlns:a14="http://schemas.microsoft.com/office/drawing/2010/main" xmlns:ma14="http://schemas.microsoft.com/office/mac/drawingml/2011/main" val="1"/>
+            </a:ext>
+          </a:extLst>
+        </p:spPr>
+        <p:txBody>
+          <a:bodyPr wrap="none" lIns="45719" rIns="45719" anchor="ctr">
+            <a:spAutoFit/>
+          </a:bodyPr>
+          <a:lstStyle>
+            <a:lvl1pPr algn="r">
+              <a:defRPr sz="1200">
+                <a:solidFill>
+                  <a:srgbClr val="888888"/>
+                </a:solidFill>
+              </a:defRPr>
+            </a:lvl1pPr>
+          </a:lstStyle>
+          <a:p>
+            <a:fld id="{86CB4B4D-7CA3-9044-876B-883B54F8677D}" type="slidenum">
+              <a:t>13</a:t>
+            </a:fld>
+            <a:endParaRPr/>
+          </a:p>
+        </p:txBody>
+      </p:sp>
+    </p:spTree>
+    <p:extLst>
+      <p:ext uri="{BB962C8B-B14F-4D97-AF65-F5344CB8AC3E}">
+        <p14:creationId xmlns:p14="http://schemas.microsoft.com/office/powerpoint/2010/main" val="4005661179"/>
+      </p:ext>
+    </p:extLst>
+  </p:cSld>
+  <p:clrMapOvr>
+    <a:masterClrMapping/>
+  </p:clrMapOvr>
+  <p:transition spd="med"/>
+</p:sld>
+</file>
+
+<file path=ppt/slides/slide14.xml><?xml version="1.0" encoding="utf-8"?>
+<p:sld xmlns:a="http://schemas.openxmlformats.org/drawingml/2006/main" xmlns:r="http://schemas.openxmlformats.org/officeDocument/2006/relationships" xmlns:p="http://schemas.openxmlformats.org/presentationml/2006/main">
+  <p:cSld>
+    <p:bg>
+      <p:bgPr>
+        <a:solidFill>
+          <a:srgbClr val="FFFF00"/>
+        </a:solidFill>
+        <a:effectLst/>
+      </p:bgPr>
+    </p:bg>
+    <p:spTree>
+      <p:nvGrpSpPr>
+        <p:cNvPr id="1" name=""/>
+        <p:cNvGrpSpPr/>
+        <p:nvPr/>
+      </p:nvGrpSpPr>
+      <p:grpSpPr>
+        <a:xfrm>
+          <a:off x="0" y="0"/>
+          <a:ext cx="0" cy="0"/>
+          <a:chOff x="0" y="0"/>
+          <a:chExt cx="0" cy="0"/>
+        </a:xfrm>
+      </p:grpSpPr>
+      <p:sp>
+        <p:nvSpPr>
+          <p:cNvPr id="147" name="Slide Number"/>
           <p:cNvSpPr txBox="1">
             <a:spLocks noGrp="1"/>
           </p:cNvSpPr>
@@ -4233,6 +6049,10 @@
           </p:nvPr>
         </p:nvSpPr>
         <p:spPr>
+          <a:xfrm>
+            <a:off x="11172418" y="6414760"/>
+            <a:ext cx="181382" cy="248305"/>
+          </a:xfrm>
           <a:prstGeom prst="rect">
             <a:avLst/>
           </a:prstGeom>
@@ -4247,13 +6067,594 @@
           <a:lstStyle/>
           <a:p>
             <a:fld id="{86CB4B4D-7CA3-9044-876B-883B54F8677D}" type="slidenum">
-              <a:t>13</a:t>
+              <a:t>14</a:t>
+            </a:fld>
+            <a:endParaRPr/>
+          </a:p>
+        </p:txBody>
+      </p:sp>
+      <p:sp>
+        <p:nvSpPr>
+          <p:cNvPr id="148" name="Mejores prácticas para generar contenido de inteligencia artificial"/>
+          <p:cNvSpPr txBox="1">
+            <a:spLocks noGrp="1"/>
+          </p:cNvSpPr>
+          <p:nvPr>
+            <p:ph type="title"/>
+          </p:nvPr>
+        </p:nvSpPr>
+        <p:spPr>
+          <a:prstGeom prst="rect">
+            <a:avLst/>
+          </a:prstGeom>
+        </p:spPr>
+        <p:txBody>
+          <a:bodyPr/>
+          <a:lstStyle/>
+          <a:p>
+            <a:r>
+              <a:rPr lang="en-US" dirty="0"/>
+              <a:t>Best Practices for Generating AI Content</a:t>
+            </a:r>
+            <a:endParaRPr dirty="0"/>
+          </a:p>
+        </p:txBody>
+      </p:sp>
+      <p:sp>
+        <p:nvSpPr>
+          <p:cNvPr id="149" name="Verifique la precisión…"/>
+          <p:cNvSpPr txBox="1">
+            <a:spLocks noGrp="1"/>
+          </p:cNvSpPr>
+          <p:nvPr>
+            <p:ph type="body" sz="half" idx="1"/>
+          </p:nvPr>
+        </p:nvSpPr>
+        <p:spPr>
+          <a:xfrm>
+            <a:off x="6791676" y="2028522"/>
+            <a:ext cx="5264183" cy="4048404"/>
+          </a:xfrm>
+          <a:prstGeom prst="rect">
+            <a:avLst/>
+          </a:prstGeom>
+        </p:spPr>
+        <p:txBody>
+          <a:bodyPr/>
+          <a:lstStyle/>
+          <a:p>
+            <a:pPr marL="457200" indent="-317500" defTabSz="457200">
+              <a:lnSpc>
+                <a:spcPct val="100000"/>
+              </a:lnSpc>
+              <a:spcBef>
+                <a:spcPts val="0"/>
+              </a:spcBef>
+              <a:buClr>
+                <a:srgbClr val="1F2328"/>
+              </a:buClr>
+              <a:buFont typeface="TimesNewRomanPSMT"/>
+              <a:buAutoNum type="arabicPeriod"/>
+              <a:defRPr sz="2600">
+                <a:solidFill>
+                  <a:srgbClr val="1F2328"/>
+                </a:solidFill>
+                <a:latin typeface="Helvetica Neue"/>
+                <a:ea typeface="Helvetica Neue"/>
+                <a:cs typeface="Helvetica Neue"/>
+                <a:sym typeface="Helvetica Neue"/>
+              </a:defRPr>
+            </a:pPr>
+            <a:r>
+              <a:rPr b="1">
+                <a:latin typeface="+mn-lt"/>
+                <a:ea typeface="+mn-ea"/>
+                <a:cs typeface="+mn-cs"/>
+                <a:sym typeface="Helvetica"/>
+              </a:rPr>
+              <a:t>Verifique la precisión</a:t>
+            </a:r>
+            <a:endParaRPr>
+              <a:latin typeface="+mn-lt"/>
+              <a:ea typeface="+mn-ea"/>
+              <a:cs typeface="+mn-cs"/>
+              <a:sym typeface="Helvetica"/>
+            </a:endParaRPr>
+          </a:p>
+          <a:p>
+            <a:pPr marL="457200" indent="-317500" defTabSz="457200">
+              <a:lnSpc>
+                <a:spcPct val="100000"/>
+              </a:lnSpc>
+              <a:spcBef>
+                <a:spcPts val="0"/>
+              </a:spcBef>
+              <a:buClr>
+                <a:srgbClr val="1F2328"/>
+              </a:buClr>
+              <a:buFont typeface="TimesNewRomanPSMT"/>
+              <a:buAutoNum type="arabicPeriod"/>
+              <a:defRPr sz="2600">
+                <a:solidFill>
+                  <a:srgbClr val="0433FF"/>
+                </a:solidFill>
+                <a:latin typeface="Helvetica Neue"/>
+                <a:ea typeface="Helvetica Neue"/>
+                <a:cs typeface="Helvetica Neue"/>
+                <a:sym typeface="Helvetica Neue"/>
+              </a:defRPr>
+            </a:pPr>
+            <a:r>
+              <a:rPr b="1">
+                <a:latin typeface="+mn-lt"/>
+                <a:ea typeface="+mn-ea"/>
+                <a:cs typeface="+mn-cs"/>
+                <a:sym typeface="Helvetica"/>
+              </a:rPr>
+              <a:t>Sea específico</a:t>
+            </a:r>
+          </a:p>
+          <a:p>
+            <a:pPr marL="457200" indent="-317500" defTabSz="457200">
+              <a:lnSpc>
+                <a:spcPct val="100000"/>
+              </a:lnSpc>
+              <a:spcBef>
+                <a:spcPts val="0"/>
+              </a:spcBef>
+              <a:buClr>
+                <a:srgbClr val="1F2328"/>
+              </a:buClr>
+              <a:buFont typeface="TimesNewRomanPSMT"/>
+              <a:buAutoNum type="arabicPeriod"/>
+              <a:defRPr sz="2600">
+                <a:solidFill>
+                  <a:srgbClr val="FF9300"/>
+                </a:solidFill>
+                <a:latin typeface="Helvetica Neue"/>
+                <a:ea typeface="Helvetica Neue"/>
+                <a:cs typeface="Helvetica Neue"/>
+                <a:sym typeface="Helvetica Neue"/>
+              </a:defRPr>
+            </a:pPr>
+            <a:r>
+              <a:rPr b="1">
+                <a:latin typeface="+mn-lt"/>
+                <a:ea typeface="+mn-ea"/>
+                <a:cs typeface="+mn-cs"/>
+                <a:sym typeface="Helvetica"/>
+              </a:rPr>
+              <a:t>Iterar y refinar</a:t>
+            </a:r>
+          </a:p>
+          <a:p>
+            <a:pPr marL="457200" indent="-317500" defTabSz="457200">
+              <a:lnSpc>
+                <a:spcPct val="100000"/>
+              </a:lnSpc>
+              <a:spcBef>
+                <a:spcPts val="0"/>
+              </a:spcBef>
+              <a:buClr>
+                <a:srgbClr val="1F2328"/>
+              </a:buClr>
+              <a:buFont typeface="TimesNewRomanPSMT"/>
+              <a:buAutoNum type="arabicPeriod"/>
+              <a:defRPr sz="2600">
+                <a:solidFill>
+                  <a:srgbClr val="FF40FF"/>
+                </a:solidFill>
+                <a:latin typeface="Helvetica Neue"/>
+                <a:ea typeface="Helvetica Neue"/>
+                <a:cs typeface="Helvetica Neue"/>
+                <a:sym typeface="Helvetica Neue"/>
+              </a:defRPr>
+            </a:pPr>
+            <a:r>
+              <a:rPr b="1">
+                <a:latin typeface="+mn-lt"/>
+                <a:ea typeface="+mn-ea"/>
+                <a:cs typeface="+mn-cs"/>
+                <a:sym typeface="Helvetica"/>
+              </a:rPr>
+              <a:t>Proporcionar contexto</a:t>
+            </a:r>
+          </a:p>
+          <a:p>
+            <a:pPr marL="457200" indent="-317500" defTabSz="457200">
+              <a:lnSpc>
+                <a:spcPct val="100000"/>
+              </a:lnSpc>
+              <a:spcBef>
+                <a:spcPts val="0"/>
+              </a:spcBef>
+              <a:buClr>
+                <a:srgbClr val="1F2328"/>
+              </a:buClr>
+              <a:buFont typeface="TimesNewRomanPSMT"/>
+              <a:buAutoNum type="arabicPeriod"/>
+              <a:defRPr sz="2600">
+                <a:solidFill>
+                  <a:srgbClr val="1F2328"/>
+                </a:solidFill>
+                <a:latin typeface="Helvetica Neue"/>
+                <a:ea typeface="Helvetica Neue"/>
+                <a:cs typeface="Helvetica Neue"/>
+                <a:sym typeface="Helvetica Neue"/>
+              </a:defRPr>
+            </a:pPr>
+            <a:r>
+              <a:rPr b="1">
+                <a:latin typeface="+mn-lt"/>
+                <a:ea typeface="+mn-ea"/>
+                <a:cs typeface="+mn-cs"/>
+                <a:sym typeface="Helvetica"/>
+              </a:rPr>
+              <a:t>Utilice múltiples servicios</a:t>
+            </a:r>
+          </a:p>
+          <a:p>
+            <a:pPr marL="457200" indent="-317500" defTabSz="457200">
+              <a:lnSpc>
+                <a:spcPct val="100000"/>
+              </a:lnSpc>
+              <a:spcBef>
+                <a:spcPts val="0"/>
+              </a:spcBef>
+              <a:buClr>
+                <a:srgbClr val="1F2328"/>
+              </a:buClr>
+              <a:buFont typeface="TimesNewRomanPSMT"/>
+              <a:buAutoNum type="arabicPeriod"/>
+              <a:defRPr sz="2600">
+                <a:solidFill>
+                  <a:srgbClr val="942192"/>
+                </a:solidFill>
+                <a:latin typeface="Helvetica Neue"/>
+                <a:ea typeface="Helvetica Neue"/>
+                <a:cs typeface="Helvetica Neue"/>
+                <a:sym typeface="Helvetica Neue"/>
+              </a:defRPr>
+            </a:pPr>
+            <a:r>
+              <a:rPr b="1">
+                <a:latin typeface="+mn-lt"/>
+                <a:ea typeface="+mn-ea"/>
+                <a:cs typeface="+mn-cs"/>
+                <a:sym typeface="Helvetica"/>
+              </a:rPr>
+              <a:t>Recuerde de las restricciones</a:t>
+            </a:r>
+          </a:p>
+          <a:p>
+            <a:pPr marL="457200" indent="-317500" defTabSz="457200">
+              <a:lnSpc>
+                <a:spcPct val="100000"/>
+              </a:lnSpc>
+              <a:spcBef>
+                <a:spcPts val="0"/>
+              </a:spcBef>
+              <a:buClr>
+                <a:srgbClr val="1F2328"/>
+              </a:buClr>
+              <a:buFont typeface="TimesNewRomanPSMT"/>
+              <a:buAutoNum type="arabicPeriod"/>
+              <a:defRPr sz="2600">
+                <a:solidFill>
+                  <a:srgbClr val="1F2328"/>
+                </a:solidFill>
+                <a:latin typeface="Helvetica Neue"/>
+                <a:ea typeface="Helvetica Neue"/>
+                <a:cs typeface="Helvetica Neue"/>
+                <a:sym typeface="Helvetica Neue"/>
+              </a:defRPr>
+            </a:pPr>
+            <a:r>
+              <a:rPr b="1">
+                <a:latin typeface="+mn-lt"/>
+                <a:ea typeface="+mn-ea"/>
+                <a:cs typeface="+mn-cs"/>
+                <a:sym typeface="Helvetica"/>
+              </a:rPr>
+              <a:t>Crear plantillas</a:t>
+            </a:r>
+          </a:p>
+        </p:txBody>
+      </p:sp>
+      <p:sp>
+        <p:nvSpPr>
+          <p:cNvPr id="150" name="Content Placeholder 2"/>
+          <p:cNvSpPr txBox="1"/>
+          <p:nvPr/>
+        </p:nvSpPr>
+        <p:spPr>
+          <a:xfrm>
+            <a:off x="19327" y="2028522"/>
+            <a:ext cx="4609515" cy="4351339"/>
+          </a:xfrm>
+          <a:prstGeom prst="rect">
+            <a:avLst/>
+          </a:prstGeom>
+          <a:ln w="12700">
+            <a:miter lim="400000"/>
+          </a:ln>
+          <a:extLst>
+            <a:ext uri="{C572A759-6A51-4108-AA02-DFA0A04FC94B}">
+              <ma14:wrappingTextBoxFlag xmlns:ma14="http://schemas.microsoft.com/office/mac/drawingml/2011/main" xmlns:a14="http://schemas.microsoft.com/office/drawing/2010/main" xmlns:m="http://schemas.openxmlformats.org/officeDocument/2006/math" xmlns="" val="1"/>
+            </a:ext>
+          </a:extLst>
+        </p:spPr>
+        <p:txBody>
+          <a:bodyPr lIns="45719" rIns="45719">
+            <a:normAutofit/>
+          </a:bodyPr>
+          <a:lstStyle/>
+          <a:p>
+            <a:pPr marL="457200" indent="-317500" defTabSz="457200">
+              <a:buClr>
+                <a:srgbClr val="1F2328"/>
+              </a:buClr>
+              <a:buSzPct val="100000"/>
+              <a:buFont typeface="TimesNewRomanPSMT"/>
+              <a:buAutoNum type="arabicPeriod"/>
+              <a:defRPr sz="2600">
+                <a:solidFill>
+                  <a:srgbClr val="1F2328"/>
+                </a:solidFill>
+                <a:latin typeface="Helvetica Neue"/>
+                <a:ea typeface="Helvetica Neue"/>
+                <a:cs typeface="Helvetica Neue"/>
+                <a:sym typeface="Helvetica Neue"/>
+              </a:defRPr>
+            </a:pPr>
+            <a:r>
+              <a:rPr b="1">
+                <a:latin typeface="+mn-lt"/>
+                <a:ea typeface="+mn-ea"/>
+                <a:cs typeface="+mn-cs"/>
+                <a:sym typeface="Helvetica"/>
+              </a:rPr>
+              <a:t>Check for Accuracy</a:t>
+            </a:r>
+          </a:p>
+          <a:p>
+            <a:pPr marL="457200" indent="-317500" defTabSz="457200">
+              <a:buClr>
+                <a:srgbClr val="1F2328"/>
+              </a:buClr>
+              <a:buSzPct val="100000"/>
+              <a:buFont typeface="TimesNewRomanPSMT"/>
+              <a:buAutoNum type="arabicPeriod"/>
+              <a:defRPr sz="2600">
+                <a:solidFill>
+                  <a:srgbClr val="0433FF"/>
+                </a:solidFill>
+                <a:latin typeface="Helvetica Neue"/>
+                <a:ea typeface="Helvetica Neue"/>
+                <a:cs typeface="Helvetica Neue"/>
+                <a:sym typeface="Helvetica Neue"/>
+              </a:defRPr>
+            </a:pPr>
+            <a:r>
+              <a:rPr b="1">
+                <a:latin typeface="+mn-lt"/>
+                <a:ea typeface="+mn-ea"/>
+                <a:cs typeface="+mn-cs"/>
+                <a:sym typeface="Helvetica"/>
+              </a:rPr>
+              <a:t>Be Specific</a:t>
+            </a:r>
+            <a:r>
+              <a:t>: </a:t>
+            </a:r>
+          </a:p>
+          <a:p>
+            <a:pPr marL="457200" indent="-317500" defTabSz="457200">
+              <a:buClr>
+                <a:srgbClr val="1F2328"/>
+              </a:buClr>
+              <a:buSzPct val="100000"/>
+              <a:buFont typeface="TimesNewRomanPSMT"/>
+              <a:buAutoNum type="arabicPeriod"/>
+              <a:defRPr sz="2600">
+                <a:solidFill>
+                  <a:srgbClr val="FF9300"/>
+                </a:solidFill>
+                <a:latin typeface="Helvetica Neue"/>
+                <a:ea typeface="Helvetica Neue"/>
+                <a:cs typeface="Helvetica Neue"/>
+                <a:sym typeface="Helvetica Neue"/>
+              </a:defRPr>
+            </a:pPr>
+            <a:r>
+              <a:rPr b="1">
+                <a:latin typeface="+mn-lt"/>
+                <a:ea typeface="+mn-ea"/>
+                <a:cs typeface="+mn-cs"/>
+                <a:sym typeface="Helvetica"/>
+              </a:rPr>
+              <a:t>Iterate and Refine</a:t>
+            </a:r>
+            <a:r>
+              <a:t>: </a:t>
+            </a:r>
+          </a:p>
+          <a:p>
+            <a:pPr marL="457200" indent="-317500" defTabSz="457200">
+              <a:buClr>
+                <a:srgbClr val="1F2328"/>
+              </a:buClr>
+              <a:buSzPct val="100000"/>
+              <a:buFont typeface="TimesNewRomanPSMT"/>
+              <a:buAutoNum type="arabicPeriod"/>
+              <a:defRPr sz="2600">
+                <a:solidFill>
+                  <a:srgbClr val="FF40FF"/>
+                </a:solidFill>
+                <a:latin typeface="Helvetica Neue"/>
+                <a:ea typeface="Helvetica Neue"/>
+                <a:cs typeface="Helvetica Neue"/>
+                <a:sym typeface="Helvetica Neue"/>
+              </a:defRPr>
+            </a:pPr>
+            <a:r>
+              <a:rPr b="1">
+                <a:latin typeface="+mn-lt"/>
+                <a:ea typeface="+mn-ea"/>
+                <a:cs typeface="+mn-cs"/>
+                <a:sym typeface="Helvetica"/>
+              </a:rPr>
+              <a:t>Provide Context</a:t>
+            </a:r>
+            <a:r>
+              <a:t>:</a:t>
+            </a:r>
+          </a:p>
+          <a:p>
+            <a:pPr marL="457200" indent="-317500" defTabSz="457200">
+              <a:buClr>
+                <a:srgbClr val="1F2328"/>
+              </a:buClr>
+              <a:buSzPct val="100000"/>
+              <a:buFont typeface="TimesNewRomanPSMT"/>
+              <a:buAutoNum type="arabicPeriod"/>
+              <a:defRPr sz="2600">
+                <a:solidFill>
+                  <a:srgbClr val="1F2328"/>
+                </a:solidFill>
+                <a:latin typeface="Helvetica Neue"/>
+                <a:ea typeface="Helvetica Neue"/>
+                <a:cs typeface="Helvetica Neue"/>
+                <a:sym typeface="Helvetica Neue"/>
+              </a:defRPr>
+            </a:pPr>
+            <a:r>
+              <a:rPr b="1">
+                <a:latin typeface="+mn-lt"/>
+                <a:ea typeface="+mn-ea"/>
+                <a:cs typeface="+mn-cs"/>
+                <a:sym typeface="Helvetica"/>
+              </a:rPr>
+              <a:t>Use Multiple Services</a:t>
+            </a:r>
+            <a:r>
+              <a:t>:</a:t>
+            </a:r>
+          </a:p>
+          <a:p>
+            <a:pPr marL="457200" indent="-317500" defTabSz="457200">
+              <a:buClr>
+                <a:srgbClr val="1F2328"/>
+              </a:buClr>
+              <a:buSzPct val="100000"/>
+              <a:buFont typeface="TimesNewRomanPSMT"/>
+              <a:buAutoNum type="arabicPeriod"/>
+              <a:defRPr sz="2600">
+                <a:solidFill>
+                  <a:srgbClr val="942192"/>
+                </a:solidFill>
+                <a:latin typeface="Helvetica Neue"/>
+                <a:ea typeface="Helvetica Neue"/>
+                <a:cs typeface="Helvetica Neue"/>
+                <a:sym typeface="Helvetica Neue"/>
+              </a:defRPr>
+            </a:pPr>
+            <a:r>
+              <a:rPr b="1">
+                <a:latin typeface="+mn-lt"/>
+                <a:ea typeface="+mn-ea"/>
+                <a:cs typeface="+mn-cs"/>
+                <a:sym typeface="Helvetica"/>
+              </a:rPr>
+              <a:t>Remind AI of Constraints</a:t>
+            </a:r>
+            <a:r>
+              <a:t>:</a:t>
+            </a:r>
+          </a:p>
+          <a:p>
+            <a:pPr marL="457200" indent="-317500" defTabSz="457200">
+              <a:buClr>
+                <a:srgbClr val="1F2328"/>
+              </a:buClr>
+              <a:buSzPct val="100000"/>
+              <a:buFont typeface="TimesNewRomanPSMT"/>
+              <a:buAutoNum type="arabicPeriod"/>
+              <a:defRPr sz="2600">
+                <a:solidFill>
+                  <a:srgbClr val="1F2328"/>
+                </a:solidFill>
+                <a:latin typeface="Helvetica Neue"/>
+                <a:ea typeface="Helvetica Neue"/>
+                <a:cs typeface="Helvetica Neue"/>
+                <a:sym typeface="Helvetica Neue"/>
+              </a:defRPr>
+            </a:pPr>
+            <a:r>
+              <a:rPr b="1">
+                <a:latin typeface="+mn-lt"/>
+                <a:ea typeface="+mn-ea"/>
+                <a:cs typeface="+mn-cs"/>
+                <a:sym typeface="Helvetica"/>
+              </a:rPr>
+              <a:t>Make Templates</a:t>
+            </a:r>
+            <a:r>
+              <a:t>:</a:t>
+            </a:r>
+          </a:p>
+        </p:txBody>
+      </p:sp>
+      <p:sp>
+        <p:nvSpPr>
+          <p:cNvPr id="151" name="Text"/>
+          <p:cNvSpPr txBox="1"/>
+          <p:nvPr/>
+        </p:nvSpPr>
+        <p:spPr>
+          <a:xfrm>
+            <a:off x="11172418" y="6414760"/>
+            <a:ext cx="181382" cy="248305"/>
+          </a:xfrm>
+          <a:prstGeom prst="rect">
+            <a:avLst/>
+          </a:prstGeom>
+          <a:ln w="12700">
+            <a:miter lim="400000"/>
+          </a:ln>
+          <a:extLst>
+            <a:ext uri="{C572A759-6A51-4108-AA02-DFA0A04FC94B}">
+              <ma14:wrappingTextBoxFlag xmlns:ma14="http://schemas.microsoft.com/office/mac/drawingml/2011/main" xmlns:a14="http://schemas.microsoft.com/office/drawing/2010/main" xmlns:m="http://schemas.openxmlformats.org/officeDocument/2006/math" xmlns="" val="1"/>
+            </a:ext>
+          </a:extLst>
+        </p:spPr>
+        <p:txBody>
+          <a:bodyPr wrap="none" lIns="45719" rIns="45719" anchor="ctr">
+            <a:spAutoFit/>
+          </a:bodyPr>
+          <a:lstStyle>
+            <a:lvl1pPr algn="r">
+              <a:defRPr sz="1200">
+                <a:solidFill>
+                  <a:srgbClr val="888888"/>
+                </a:solidFill>
+              </a:defRPr>
+            </a:lvl1pPr>
+          </a:lstStyle>
+          <a:p>
+            <a:fld id="{86CB4B4D-7CA3-9044-876B-883B54F8677D}" type="slidenum">
+              <a:t>14</a:t>
             </a:fld>
             <a:endParaRPr/>
           </a:p>
         </p:txBody>
       </p:sp>
     </p:spTree>
+    <p:extLst>
+      <p:ext uri="{BB962C8B-B14F-4D97-AF65-F5344CB8AC3E}">
+        <p14:creationId xmlns:p14="http://schemas.microsoft.com/office/powerpoint/2010/main" val="1860612879"/>
+      </p:ext>
+    </p:extLst>
   </p:cSld>
   <p:clrMapOvr>
     <a:masterClrMapping/>
@@ -4262,7 +6663,647 @@
 </p:sld>
 </file>
 
-<file path=ppt/slides/slide14.xml><?xml version="1.0" encoding="utf-8"?>
+<file path=ppt/slides/slide15.xml><?xml version="1.0" encoding="utf-8"?>
+<p:sld xmlns:a="http://schemas.openxmlformats.org/drawingml/2006/main" xmlns:r="http://schemas.openxmlformats.org/officeDocument/2006/relationships" xmlns:p="http://schemas.openxmlformats.org/presentationml/2006/main">
+  <p:cSld>
+    <p:spTree>
+      <p:nvGrpSpPr>
+        <p:cNvPr id="1" name=""/>
+        <p:cNvGrpSpPr/>
+        <p:nvPr/>
+      </p:nvGrpSpPr>
+      <p:grpSpPr>
+        <a:xfrm>
+          <a:off x="0" y="0"/>
+          <a:ext cx="0" cy="0"/>
+          <a:chOff x="0" y="0"/>
+          <a:chExt cx="0" cy="0"/>
+        </a:xfrm>
+      </p:grpSpPr>
+      <p:sp>
+        <p:nvSpPr>
+          <p:cNvPr id="147" name="Slide Number"/>
+          <p:cNvSpPr txBox="1">
+            <a:spLocks noGrp="1"/>
+          </p:cNvSpPr>
+          <p:nvPr>
+            <p:ph type="sldNum" sz="quarter" idx="2"/>
+          </p:nvPr>
+        </p:nvSpPr>
+        <p:spPr>
+          <a:xfrm>
+            <a:off x="11172418" y="6414760"/>
+            <a:ext cx="181382" cy="248305"/>
+          </a:xfrm>
+          <a:prstGeom prst="rect">
+            <a:avLst/>
+          </a:prstGeom>
+          <a:extLst>
+            <a:ext uri="{C572A759-6A51-4108-AA02-DFA0A04FC94B}">
+              <ma14:wrappingTextBoxFlag xmlns="" xmlns:m="http://schemas.openxmlformats.org/officeDocument/2006/math" xmlns:a14="http://schemas.microsoft.com/office/drawing/2010/main" xmlns:ma14="http://schemas.microsoft.com/office/mac/drawingml/2011/main" val="1"/>
+            </a:ext>
+          </a:extLst>
+        </p:spPr>
+        <p:txBody>
+          <a:bodyPr/>
+          <a:lstStyle/>
+          <a:p>
+            <a:fld id="{86CB4B4D-7CA3-9044-876B-883B54F8677D}" type="slidenum">
+              <a:t>15</a:t>
+            </a:fld>
+            <a:endParaRPr/>
+          </a:p>
+        </p:txBody>
+      </p:sp>
+      <p:sp>
+        <p:nvSpPr>
+          <p:cNvPr id="148" name="Mejores prácticas para generar contenido de inteligencia artificial"/>
+          <p:cNvSpPr txBox="1">
+            <a:spLocks noGrp="1"/>
+          </p:cNvSpPr>
+          <p:nvPr>
+            <p:ph type="title"/>
+          </p:nvPr>
+        </p:nvSpPr>
+        <p:spPr>
+          <a:prstGeom prst="rect">
+            <a:avLst/>
+          </a:prstGeom>
+        </p:spPr>
+        <p:txBody>
+          <a:bodyPr/>
+          <a:lstStyle/>
+          <a:p>
+            <a:r>
+              <a:t>Mejores prácticas para generar contenido de inteligencia artificial</a:t>
+            </a:r>
+          </a:p>
+        </p:txBody>
+      </p:sp>
+      <p:sp>
+        <p:nvSpPr>
+          <p:cNvPr id="149" name="Verifique la precisión…"/>
+          <p:cNvSpPr txBox="1">
+            <a:spLocks noGrp="1"/>
+          </p:cNvSpPr>
+          <p:nvPr>
+            <p:ph type="body" sz="half" idx="1"/>
+          </p:nvPr>
+        </p:nvSpPr>
+        <p:spPr>
+          <a:xfrm>
+            <a:off x="6791676" y="2028522"/>
+            <a:ext cx="5264183" cy="4048404"/>
+          </a:xfrm>
+          <a:prstGeom prst="rect">
+            <a:avLst/>
+          </a:prstGeom>
+        </p:spPr>
+        <p:txBody>
+          <a:bodyPr/>
+          <a:lstStyle/>
+          <a:p>
+            <a:pPr marL="457200" indent="-317500" defTabSz="457200">
+              <a:lnSpc>
+                <a:spcPct val="100000"/>
+              </a:lnSpc>
+              <a:spcBef>
+                <a:spcPts val="0"/>
+              </a:spcBef>
+              <a:buClr>
+                <a:srgbClr val="1F2328"/>
+              </a:buClr>
+              <a:buFont typeface="TimesNewRomanPSMT"/>
+              <a:buAutoNum type="arabicPeriod"/>
+              <a:defRPr sz="2600">
+                <a:solidFill>
+                  <a:srgbClr val="1F2328"/>
+                </a:solidFill>
+                <a:latin typeface="Helvetica Neue"/>
+                <a:ea typeface="Helvetica Neue"/>
+                <a:cs typeface="Helvetica Neue"/>
+                <a:sym typeface="Helvetica Neue"/>
+              </a:defRPr>
+            </a:pPr>
+            <a:r>
+              <a:rPr b="1">
+                <a:latin typeface="+mn-lt"/>
+                <a:ea typeface="+mn-ea"/>
+                <a:cs typeface="+mn-cs"/>
+                <a:sym typeface="Helvetica"/>
+              </a:rPr>
+              <a:t>Verifique la precisión</a:t>
+            </a:r>
+            <a:endParaRPr>
+              <a:latin typeface="+mn-lt"/>
+              <a:ea typeface="+mn-ea"/>
+              <a:cs typeface="+mn-cs"/>
+              <a:sym typeface="Helvetica"/>
+            </a:endParaRPr>
+          </a:p>
+          <a:p>
+            <a:pPr marL="457200" indent="-317500" defTabSz="457200">
+              <a:lnSpc>
+                <a:spcPct val="100000"/>
+              </a:lnSpc>
+              <a:spcBef>
+                <a:spcPts val="0"/>
+              </a:spcBef>
+              <a:buClr>
+                <a:srgbClr val="1F2328"/>
+              </a:buClr>
+              <a:buFont typeface="TimesNewRomanPSMT"/>
+              <a:buAutoNum type="arabicPeriod"/>
+              <a:defRPr sz="2600">
+                <a:solidFill>
+                  <a:srgbClr val="0433FF"/>
+                </a:solidFill>
+                <a:latin typeface="Helvetica Neue"/>
+                <a:ea typeface="Helvetica Neue"/>
+                <a:cs typeface="Helvetica Neue"/>
+                <a:sym typeface="Helvetica Neue"/>
+              </a:defRPr>
+            </a:pPr>
+            <a:r>
+              <a:rPr b="1">
+                <a:latin typeface="+mn-lt"/>
+                <a:ea typeface="+mn-ea"/>
+                <a:cs typeface="+mn-cs"/>
+                <a:sym typeface="Helvetica"/>
+              </a:rPr>
+              <a:t>Sea específico</a:t>
+            </a:r>
+          </a:p>
+          <a:p>
+            <a:pPr marL="457200" indent="-317500" defTabSz="457200">
+              <a:lnSpc>
+                <a:spcPct val="100000"/>
+              </a:lnSpc>
+              <a:spcBef>
+                <a:spcPts val="0"/>
+              </a:spcBef>
+              <a:buClr>
+                <a:srgbClr val="1F2328"/>
+              </a:buClr>
+              <a:buFont typeface="TimesNewRomanPSMT"/>
+              <a:buAutoNum type="arabicPeriod"/>
+              <a:defRPr sz="2600">
+                <a:solidFill>
+                  <a:srgbClr val="FF9300"/>
+                </a:solidFill>
+                <a:latin typeface="Helvetica Neue"/>
+                <a:ea typeface="Helvetica Neue"/>
+                <a:cs typeface="Helvetica Neue"/>
+                <a:sym typeface="Helvetica Neue"/>
+              </a:defRPr>
+            </a:pPr>
+            <a:r>
+              <a:rPr b="1">
+                <a:latin typeface="+mn-lt"/>
+                <a:ea typeface="+mn-ea"/>
+                <a:cs typeface="+mn-cs"/>
+                <a:sym typeface="Helvetica"/>
+              </a:rPr>
+              <a:t>Iterar y refinar</a:t>
+            </a:r>
+          </a:p>
+          <a:p>
+            <a:pPr marL="457200" indent="-317500" defTabSz="457200">
+              <a:lnSpc>
+                <a:spcPct val="100000"/>
+              </a:lnSpc>
+              <a:spcBef>
+                <a:spcPts val="0"/>
+              </a:spcBef>
+              <a:buClr>
+                <a:srgbClr val="1F2328"/>
+              </a:buClr>
+              <a:buFont typeface="TimesNewRomanPSMT"/>
+              <a:buAutoNum type="arabicPeriod"/>
+              <a:defRPr sz="2600">
+                <a:solidFill>
+                  <a:srgbClr val="FF40FF"/>
+                </a:solidFill>
+                <a:latin typeface="Helvetica Neue"/>
+                <a:ea typeface="Helvetica Neue"/>
+                <a:cs typeface="Helvetica Neue"/>
+                <a:sym typeface="Helvetica Neue"/>
+              </a:defRPr>
+            </a:pPr>
+            <a:r>
+              <a:rPr b="1">
+                <a:latin typeface="+mn-lt"/>
+                <a:ea typeface="+mn-ea"/>
+                <a:cs typeface="+mn-cs"/>
+                <a:sym typeface="Helvetica"/>
+              </a:rPr>
+              <a:t>Proporcionar contexto</a:t>
+            </a:r>
+          </a:p>
+          <a:p>
+            <a:pPr marL="457200" indent="-317500" defTabSz="457200">
+              <a:lnSpc>
+                <a:spcPct val="100000"/>
+              </a:lnSpc>
+              <a:spcBef>
+                <a:spcPts val="0"/>
+              </a:spcBef>
+              <a:buClr>
+                <a:srgbClr val="1F2328"/>
+              </a:buClr>
+              <a:buFont typeface="TimesNewRomanPSMT"/>
+              <a:buAutoNum type="arabicPeriod"/>
+              <a:defRPr sz="2600">
+                <a:solidFill>
+                  <a:srgbClr val="1F2328"/>
+                </a:solidFill>
+                <a:latin typeface="Helvetica Neue"/>
+                <a:ea typeface="Helvetica Neue"/>
+                <a:cs typeface="Helvetica Neue"/>
+                <a:sym typeface="Helvetica Neue"/>
+              </a:defRPr>
+            </a:pPr>
+            <a:r>
+              <a:rPr b="1">
+                <a:latin typeface="+mn-lt"/>
+                <a:ea typeface="+mn-ea"/>
+                <a:cs typeface="+mn-cs"/>
+                <a:sym typeface="Helvetica"/>
+              </a:rPr>
+              <a:t>Utilice múltiples servicios</a:t>
+            </a:r>
+          </a:p>
+          <a:p>
+            <a:pPr marL="457200" indent="-317500" defTabSz="457200">
+              <a:lnSpc>
+                <a:spcPct val="100000"/>
+              </a:lnSpc>
+              <a:spcBef>
+                <a:spcPts val="0"/>
+              </a:spcBef>
+              <a:buClr>
+                <a:srgbClr val="1F2328"/>
+              </a:buClr>
+              <a:buFont typeface="TimesNewRomanPSMT"/>
+              <a:buAutoNum type="arabicPeriod"/>
+              <a:defRPr sz="2600">
+                <a:solidFill>
+                  <a:srgbClr val="942192"/>
+                </a:solidFill>
+                <a:latin typeface="Helvetica Neue"/>
+                <a:ea typeface="Helvetica Neue"/>
+                <a:cs typeface="Helvetica Neue"/>
+                <a:sym typeface="Helvetica Neue"/>
+              </a:defRPr>
+            </a:pPr>
+            <a:r>
+              <a:rPr b="1">
+                <a:latin typeface="+mn-lt"/>
+                <a:ea typeface="+mn-ea"/>
+                <a:cs typeface="+mn-cs"/>
+                <a:sym typeface="Helvetica"/>
+              </a:rPr>
+              <a:t>Recuerde de las restricciones</a:t>
+            </a:r>
+          </a:p>
+          <a:p>
+            <a:pPr marL="457200" indent="-317500" defTabSz="457200">
+              <a:lnSpc>
+                <a:spcPct val="100000"/>
+              </a:lnSpc>
+              <a:spcBef>
+                <a:spcPts val="0"/>
+              </a:spcBef>
+              <a:buClr>
+                <a:srgbClr val="1F2328"/>
+              </a:buClr>
+              <a:buFont typeface="TimesNewRomanPSMT"/>
+              <a:buAutoNum type="arabicPeriod"/>
+              <a:defRPr sz="2600">
+                <a:solidFill>
+                  <a:srgbClr val="1F2328"/>
+                </a:solidFill>
+                <a:latin typeface="Helvetica Neue"/>
+                <a:ea typeface="Helvetica Neue"/>
+                <a:cs typeface="Helvetica Neue"/>
+                <a:sym typeface="Helvetica Neue"/>
+              </a:defRPr>
+            </a:pPr>
+            <a:r>
+              <a:rPr b="1">
+                <a:latin typeface="+mn-lt"/>
+                <a:ea typeface="+mn-ea"/>
+                <a:cs typeface="+mn-cs"/>
+                <a:sym typeface="Helvetica"/>
+              </a:rPr>
+              <a:t>Crear plantillas</a:t>
+            </a:r>
+          </a:p>
+        </p:txBody>
+      </p:sp>
+      <p:sp>
+        <p:nvSpPr>
+          <p:cNvPr id="150" name="Content Placeholder 2"/>
+          <p:cNvSpPr txBox="1"/>
+          <p:nvPr/>
+        </p:nvSpPr>
+        <p:spPr>
+          <a:xfrm>
+            <a:off x="19327" y="2028522"/>
+            <a:ext cx="4609515" cy="4351339"/>
+          </a:xfrm>
+          <a:prstGeom prst="rect">
+            <a:avLst/>
+          </a:prstGeom>
+          <a:ln w="12700">
+            <a:miter lim="400000"/>
+          </a:ln>
+          <a:extLst>
+            <a:ext uri="{C572A759-6A51-4108-AA02-DFA0A04FC94B}">
+              <ma14:wrappingTextBoxFlag xmlns="" xmlns:m="http://schemas.openxmlformats.org/officeDocument/2006/math" xmlns:a14="http://schemas.microsoft.com/office/drawing/2010/main" xmlns:ma14="http://schemas.microsoft.com/office/mac/drawingml/2011/main" val="1"/>
+            </a:ext>
+          </a:extLst>
+        </p:spPr>
+        <p:txBody>
+          <a:bodyPr lIns="45719" rIns="45719">
+            <a:normAutofit/>
+          </a:bodyPr>
+          <a:lstStyle/>
+          <a:p>
+            <a:pPr marL="457200" indent="-317500" defTabSz="457200">
+              <a:buClr>
+                <a:srgbClr val="1F2328"/>
+              </a:buClr>
+              <a:buSzPct val="100000"/>
+              <a:buFont typeface="TimesNewRomanPSMT"/>
+              <a:buAutoNum type="arabicPeriod"/>
+              <a:defRPr sz="2600">
+                <a:solidFill>
+                  <a:srgbClr val="1F2328"/>
+                </a:solidFill>
+                <a:latin typeface="Helvetica Neue"/>
+                <a:ea typeface="Helvetica Neue"/>
+                <a:cs typeface="Helvetica Neue"/>
+                <a:sym typeface="Helvetica Neue"/>
+              </a:defRPr>
+            </a:pPr>
+            <a:r>
+              <a:rPr b="1">
+                <a:latin typeface="+mn-lt"/>
+                <a:ea typeface="+mn-ea"/>
+                <a:cs typeface="+mn-cs"/>
+                <a:sym typeface="Helvetica"/>
+              </a:rPr>
+              <a:t>Check for Accuracy</a:t>
+            </a:r>
+          </a:p>
+          <a:p>
+            <a:pPr marL="457200" indent="-317500" defTabSz="457200">
+              <a:buClr>
+                <a:srgbClr val="1F2328"/>
+              </a:buClr>
+              <a:buSzPct val="100000"/>
+              <a:buFont typeface="TimesNewRomanPSMT"/>
+              <a:buAutoNum type="arabicPeriod"/>
+              <a:defRPr sz="2600">
+                <a:solidFill>
+                  <a:srgbClr val="0433FF"/>
+                </a:solidFill>
+                <a:latin typeface="Helvetica Neue"/>
+                <a:ea typeface="Helvetica Neue"/>
+                <a:cs typeface="Helvetica Neue"/>
+                <a:sym typeface="Helvetica Neue"/>
+              </a:defRPr>
+            </a:pPr>
+            <a:r>
+              <a:rPr b="1">
+                <a:latin typeface="+mn-lt"/>
+                <a:ea typeface="+mn-ea"/>
+                <a:cs typeface="+mn-cs"/>
+                <a:sym typeface="Helvetica"/>
+              </a:rPr>
+              <a:t>Be Specific</a:t>
+            </a:r>
+            <a:r>
+              <a:t>: </a:t>
+            </a:r>
+          </a:p>
+          <a:p>
+            <a:pPr marL="457200" indent="-317500" defTabSz="457200">
+              <a:buClr>
+                <a:srgbClr val="1F2328"/>
+              </a:buClr>
+              <a:buSzPct val="100000"/>
+              <a:buFont typeface="TimesNewRomanPSMT"/>
+              <a:buAutoNum type="arabicPeriod"/>
+              <a:defRPr sz="2600">
+                <a:solidFill>
+                  <a:srgbClr val="FF9300"/>
+                </a:solidFill>
+                <a:latin typeface="Helvetica Neue"/>
+                <a:ea typeface="Helvetica Neue"/>
+                <a:cs typeface="Helvetica Neue"/>
+                <a:sym typeface="Helvetica Neue"/>
+              </a:defRPr>
+            </a:pPr>
+            <a:r>
+              <a:rPr b="1">
+                <a:latin typeface="+mn-lt"/>
+                <a:ea typeface="+mn-ea"/>
+                <a:cs typeface="+mn-cs"/>
+                <a:sym typeface="Helvetica"/>
+              </a:rPr>
+              <a:t>Iterate and Refine</a:t>
+            </a:r>
+            <a:r>
+              <a:t>: </a:t>
+            </a:r>
+          </a:p>
+          <a:p>
+            <a:pPr marL="457200" indent="-317500" defTabSz="457200">
+              <a:buClr>
+                <a:srgbClr val="1F2328"/>
+              </a:buClr>
+              <a:buSzPct val="100000"/>
+              <a:buFont typeface="TimesNewRomanPSMT"/>
+              <a:buAutoNum type="arabicPeriod"/>
+              <a:defRPr sz="2600">
+                <a:solidFill>
+                  <a:srgbClr val="FF40FF"/>
+                </a:solidFill>
+                <a:latin typeface="Helvetica Neue"/>
+                <a:ea typeface="Helvetica Neue"/>
+                <a:cs typeface="Helvetica Neue"/>
+                <a:sym typeface="Helvetica Neue"/>
+              </a:defRPr>
+            </a:pPr>
+            <a:r>
+              <a:rPr b="1">
+                <a:latin typeface="+mn-lt"/>
+                <a:ea typeface="+mn-ea"/>
+                <a:cs typeface="+mn-cs"/>
+                <a:sym typeface="Helvetica"/>
+              </a:rPr>
+              <a:t>Provide Context</a:t>
+            </a:r>
+            <a:r>
+              <a:t>:</a:t>
+            </a:r>
+          </a:p>
+          <a:p>
+            <a:pPr marL="457200" indent="-317500" defTabSz="457200">
+              <a:buClr>
+                <a:srgbClr val="1F2328"/>
+              </a:buClr>
+              <a:buSzPct val="100000"/>
+              <a:buFont typeface="TimesNewRomanPSMT"/>
+              <a:buAutoNum type="arabicPeriod"/>
+              <a:defRPr sz="2600">
+                <a:solidFill>
+                  <a:srgbClr val="1F2328"/>
+                </a:solidFill>
+                <a:latin typeface="Helvetica Neue"/>
+                <a:ea typeface="Helvetica Neue"/>
+                <a:cs typeface="Helvetica Neue"/>
+                <a:sym typeface="Helvetica Neue"/>
+              </a:defRPr>
+            </a:pPr>
+            <a:r>
+              <a:rPr b="1">
+                <a:latin typeface="+mn-lt"/>
+                <a:ea typeface="+mn-ea"/>
+                <a:cs typeface="+mn-cs"/>
+                <a:sym typeface="Helvetica"/>
+              </a:rPr>
+              <a:t>Use Multiple Services</a:t>
+            </a:r>
+            <a:r>
+              <a:t>:</a:t>
+            </a:r>
+          </a:p>
+          <a:p>
+            <a:pPr marL="457200" indent="-317500" defTabSz="457200">
+              <a:buClr>
+                <a:srgbClr val="1F2328"/>
+              </a:buClr>
+              <a:buSzPct val="100000"/>
+              <a:buFont typeface="TimesNewRomanPSMT"/>
+              <a:buAutoNum type="arabicPeriod"/>
+              <a:defRPr sz="2600">
+                <a:solidFill>
+                  <a:srgbClr val="942192"/>
+                </a:solidFill>
+                <a:latin typeface="Helvetica Neue"/>
+                <a:ea typeface="Helvetica Neue"/>
+                <a:cs typeface="Helvetica Neue"/>
+                <a:sym typeface="Helvetica Neue"/>
+              </a:defRPr>
+            </a:pPr>
+            <a:r>
+              <a:rPr b="1">
+                <a:latin typeface="+mn-lt"/>
+                <a:ea typeface="+mn-ea"/>
+                <a:cs typeface="+mn-cs"/>
+                <a:sym typeface="Helvetica"/>
+              </a:rPr>
+              <a:t>Remind AI of Constraints</a:t>
+            </a:r>
+            <a:r>
+              <a:t>:</a:t>
+            </a:r>
+          </a:p>
+          <a:p>
+            <a:pPr marL="457200" indent="-317500" defTabSz="457200">
+              <a:buClr>
+                <a:srgbClr val="1F2328"/>
+              </a:buClr>
+              <a:buSzPct val="100000"/>
+              <a:buFont typeface="TimesNewRomanPSMT"/>
+              <a:buAutoNum type="arabicPeriod"/>
+              <a:defRPr sz="2600">
+                <a:solidFill>
+                  <a:srgbClr val="1F2328"/>
+                </a:solidFill>
+                <a:latin typeface="Helvetica Neue"/>
+                <a:ea typeface="Helvetica Neue"/>
+                <a:cs typeface="Helvetica Neue"/>
+                <a:sym typeface="Helvetica Neue"/>
+              </a:defRPr>
+            </a:pPr>
+            <a:r>
+              <a:rPr b="1">
+                <a:latin typeface="+mn-lt"/>
+                <a:ea typeface="+mn-ea"/>
+                <a:cs typeface="+mn-cs"/>
+                <a:sym typeface="Helvetica"/>
+              </a:rPr>
+              <a:t>Make Templates</a:t>
+            </a:r>
+            <a:r>
+              <a:t>:</a:t>
+            </a:r>
+          </a:p>
+        </p:txBody>
+      </p:sp>
+      <p:sp>
+        <p:nvSpPr>
+          <p:cNvPr id="151" name="Text"/>
+          <p:cNvSpPr txBox="1"/>
+          <p:nvPr/>
+        </p:nvSpPr>
+        <p:spPr>
+          <a:xfrm>
+            <a:off x="11172418" y="6414760"/>
+            <a:ext cx="181382" cy="248305"/>
+          </a:xfrm>
+          <a:prstGeom prst="rect">
+            <a:avLst/>
+          </a:prstGeom>
+          <a:ln w="12700">
+            <a:miter lim="400000"/>
+          </a:ln>
+          <a:extLst>
+            <a:ext uri="{C572A759-6A51-4108-AA02-DFA0A04FC94B}">
+              <ma14:wrappingTextBoxFlag xmlns="" xmlns:m="http://schemas.openxmlformats.org/officeDocument/2006/math" xmlns:a14="http://schemas.microsoft.com/office/drawing/2010/main" xmlns:ma14="http://schemas.microsoft.com/office/mac/drawingml/2011/main" val="1"/>
+            </a:ext>
+          </a:extLst>
+        </p:spPr>
+        <p:txBody>
+          <a:bodyPr wrap="none" lIns="45719" rIns="45719" anchor="ctr">
+            <a:spAutoFit/>
+          </a:bodyPr>
+          <a:lstStyle>
+            <a:lvl1pPr algn="r">
+              <a:defRPr sz="1200">
+                <a:solidFill>
+                  <a:srgbClr val="888888"/>
+                </a:solidFill>
+              </a:defRPr>
+            </a:lvl1pPr>
+          </a:lstStyle>
+          <a:p>
+            <a:fld id="{86CB4B4D-7CA3-9044-876B-883B54F8677D}" type="slidenum">
+              <a:t>15</a:t>
+            </a:fld>
+            <a:endParaRPr/>
+          </a:p>
+        </p:txBody>
+      </p:sp>
+    </p:spTree>
+    <p:extLst>
+      <p:ext uri="{BB962C8B-B14F-4D97-AF65-F5344CB8AC3E}">
+        <p14:creationId xmlns:p14="http://schemas.microsoft.com/office/powerpoint/2010/main" val="1346337655"/>
+      </p:ext>
+    </p:extLst>
+  </p:cSld>
+  <p:clrMapOvr>
+    <a:masterClrMapping/>
+  </p:clrMapOvr>
+  <p:transition spd="med"/>
+</p:sld>
+</file>
+
+<file path=ppt/slides/slide16.xml><?xml version="1.0" encoding="utf-8"?>
 <p:sld xmlns:a="http://schemas.openxmlformats.org/drawingml/2006/main" xmlns:r="http://schemas.openxmlformats.org/officeDocument/2006/relationships" xmlns:p="http://schemas.openxmlformats.org/presentationml/2006/main">
   <p:cSld>
     <p:bg>
@@ -4359,7 +7400,7 @@
           </a:prstGeom>
           <a:extLst>
             <a:ext uri="{C572A759-6A51-4108-AA02-DFA0A04FC94B}">
-              <ma14:wrappingTextBoxFlag xmlns:ma14="http://schemas.microsoft.com/office/mac/drawingml/2011/main" xmlns:a14="http://schemas.microsoft.com/office/drawing/2010/main" xmlns:m="http://schemas.openxmlformats.org/officeDocument/2006/math" xmlns="" val="1"/>
+              <ma14:wrappingTextBoxFlag xmlns="" xmlns:m="http://schemas.openxmlformats.org/officeDocument/2006/math" xmlns:a14="http://schemas.microsoft.com/office/drawing/2010/main" xmlns:ma14="http://schemas.microsoft.com/office/mac/drawingml/2011/main" val="1"/>
             </a:ext>
           </a:extLst>
         </p:spPr>
@@ -4368,7 +7409,7 @@
           <a:lstStyle/>
           <a:p>
             <a:fld id="{86CB4B4D-7CA3-9044-876B-883B54F8677D}" type="slidenum">
-              <a:t>14</a:t>
+              <a:t>16</a:t>
             </a:fld>
             <a:endParaRPr/>
           </a:p>
@@ -4383,7 +7424,7 @@
 </p:sld>
 </file>
 
-<file path=ppt/slides/slide15.xml><?xml version="1.0" encoding="utf-8"?>
+<file path=ppt/slides/slide17.xml><?xml version="1.0" encoding="utf-8"?>
 <p:sld xmlns:a="http://schemas.openxmlformats.org/drawingml/2006/main" xmlns:r="http://schemas.openxmlformats.org/officeDocument/2006/relationships" xmlns:p="http://schemas.openxmlformats.org/presentationml/2006/main">
   <p:cSld>
     <p:spTree>
@@ -4472,7 +7513,7 @@
           </a:prstGeom>
           <a:extLst>
             <a:ext uri="{C572A759-6A51-4108-AA02-DFA0A04FC94B}">
-              <ma14:wrappingTextBoxFlag xmlns:ma14="http://schemas.microsoft.com/office/mac/drawingml/2011/main" xmlns:a14="http://schemas.microsoft.com/office/drawing/2010/main" xmlns:m="http://schemas.openxmlformats.org/officeDocument/2006/math" xmlns="" val="1"/>
+              <ma14:wrappingTextBoxFlag xmlns="" xmlns:m="http://schemas.openxmlformats.org/officeDocument/2006/math" xmlns:a14="http://schemas.microsoft.com/office/drawing/2010/main" xmlns:ma14="http://schemas.microsoft.com/office/mac/drawingml/2011/main" val="1"/>
             </a:ext>
           </a:extLst>
         </p:spPr>
@@ -4481,7 +7522,7 @@
           <a:lstStyle/>
           <a:p>
             <a:fld id="{86CB4B4D-7CA3-9044-876B-883B54F8677D}" type="slidenum">
-              <a:t>15</a:t>
+              <a:t>17</a:t>
             </a:fld>
             <a:endParaRPr/>
           </a:p>
@@ -4498,7 +7539,7 @@
         <p:push dir="u"/>
       </p:transition>
     </mc:Choice>
-    <mc:Fallback xmlns:a14="http://schemas.microsoft.com/office/drawing/2010/main" xmlns:m="http://schemas.openxmlformats.org/officeDocument/2006/math" xmlns="">
+    <mc:Fallback xmlns="" xmlns:m="http://schemas.openxmlformats.org/officeDocument/2006/math" xmlns:a14="http://schemas.microsoft.com/office/drawing/2010/main">
       <p:transition spd="slow">
         <p:fade/>
       </p:transition>
@@ -4507,7 +7548,7 @@
 </p:sld>
 </file>
 
-<file path=ppt/slides/slide16.xml><?xml version="1.0" encoding="utf-8"?>
+<file path=ppt/slides/slide18.xml><?xml version="1.0" encoding="utf-8"?>
 <p:sld xmlns:a="http://schemas.openxmlformats.org/drawingml/2006/main" xmlns:r="http://schemas.openxmlformats.org/officeDocument/2006/relationships" xmlns:p="http://schemas.openxmlformats.org/presentationml/2006/main">
   <p:cSld>
     <p:bg>
@@ -4534,114 +7575,154 @@
       </p:grpSpPr>
       <p:sp>
         <p:nvSpPr>
-          <p:cNvPr id="193" name="Title 2"/>
+          <p:cNvPr id="177" name="AI Tool Master Lists"/>
           <p:cNvSpPr txBox="1">
             <a:spLocks noGrp="1"/>
           </p:cNvSpPr>
           <p:nvPr>
-            <p:ph type="title" idx="4294967295"/>
+            <p:ph type="title"/>
           </p:nvPr>
         </p:nvSpPr>
         <p:spPr>
-          <a:xfrm>
-            <a:off x="2154607" y="2531859"/>
-            <a:ext cx="3658054" cy="1786516"/>
-          </a:xfrm>
           <a:prstGeom prst="rect">
             <a:avLst/>
           </a:prstGeom>
         </p:spPr>
         <p:txBody>
-          <a:bodyPr anchor="t"/>
-          <a:lstStyle>
-            <a:lvl1pPr>
-              <a:defRPr sz="4800" b="0">
-                <a:solidFill>
-                  <a:srgbClr val="44546A"/>
-                </a:solidFill>
-                <a:latin typeface="Calibri Light"/>
-                <a:ea typeface="Calibri Light"/>
-                <a:cs typeface="Calibri Light"/>
-                <a:sym typeface="Calibri Light"/>
-              </a:defRPr>
-            </a:lvl1pPr>
-          </a:lstStyle>
-          <a:p>
-            <a:r>
-              <a:t>TAKE A BREAK</a:t>
-            </a:r>
-          </a:p>
-        </p:txBody>
-      </p:sp>
-      <p:pic>
-        <p:nvPicPr>
-          <p:cNvPr id="194" name="Graphic 13" descr="Graphic 13"/>
-          <p:cNvPicPr>
-            <a:picLocks noChangeAspect="1"/>
-          </p:cNvPicPr>
-          <p:nvPr/>
-        </p:nvPicPr>
-        <p:blipFill>
-          <a:blip r:embed="rId2"/>
-          <a:stretch>
-            <a:fillRect/>
-          </a:stretch>
-        </p:blipFill>
-        <p:spPr>
-          <a:xfrm>
-            <a:off x="6379342" y="-259377"/>
-            <a:ext cx="5029201" cy="5029201"/>
-          </a:xfrm>
-          <a:prstGeom prst="rect">
-            <a:avLst/>
-          </a:prstGeom>
-          <a:ln w="12700">
-            <a:miter lim="400000"/>
-          </a:ln>
-        </p:spPr>
-      </p:pic>
-      <p:sp>
-        <p:nvSpPr>
-          <p:cNvPr id="195" name="TextBox 1"/>
-          <p:cNvSpPr txBox="1"/>
-          <p:nvPr/>
-        </p:nvSpPr>
-        <p:spPr>
-          <a:xfrm>
-            <a:off x="3715415" y="5405718"/>
-            <a:ext cx="3986136" cy="634118"/>
-          </a:xfrm>
-          <a:prstGeom prst="rect">
-            <a:avLst/>
-          </a:prstGeom>
-          <a:ln w="12700">
-            <a:miter lim="400000"/>
-          </a:ln>
-          <a:extLst>
-            <a:ext uri="{C572A759-6A51-4108-AA02-DFA0A04FC94B}">
-              <ma14:wrappingTextBoxFlag xmlns:ma14="http://schemas.microsoft.com/office/mac/drawingml/2011/main" xmlns:a14="http://schemas.microsoft.com/office/drawing/2010/main" xmlns:m="http://schemas.openxmlformats.org/officeDocument/2006/math" xmlns="" val="1"/>
-            </a:ext>
-          </a:extLst>
-        </p:spPr>
-        <p:txBody>
-          <a:bodyPr wrap="none" lIns="45719" rIns="45719">
-            <a:spAutoFit/>
-          </a:bodyPr>
-          <a:lstStyle>
-            <a:lvl1pPr>
-              <a:defRPr sz="4200" b="1"/>
-            </a:lvl1pPr>
-          </a:lstStyle>
-          <a:p>
-            <a:r>
-              <a:t>Return By: XX:XX </a:t>
+          <a:bodyPr/>
+          <a:lstStyle/>
+          <a:p>
+            <a:r>
+              <a:t>AI Tool Master Lists</a:t>
             </a:r>
           </a:p>
         </p:txBody>
       </p:sp>
       <p:sp>
         <p:nvSpPr>
-          <p:cNvPr id="196" name="Slide Number"/>
+          <p:cNvPr id="178" name="(&quot;AI tools&quot; OR &quot;GPT tools&quot; OR &quot;AI resources&quot; OR &quot;AI catalog&quot; OR &quot;AI list&quot; OR &quot;AI repository&quot; OR &quot;generative AI&quot;) (&quot;list&quot; OR &quot;collection&quot; OR &quot;catalog&quot; OR &quot;repository&quot; OR &quot;guide&quot;)…"/>
+          <p:cNvSpPr txBox="1">
+            <a:spLocks noGrp="1"/>
+          </p:cNvSpPr>
+          <p:nvPr>
+            <p:ph type="body" idx="1"/>
+          </p:nvPr>
+        </p:nvSpPr>
+        <p:spPr>
+          <a:prstGeom prst="rect">
+            <a:avLst/>
+          </a:prstGeom>
+        </p:spPr>
+        <p:txBody>
+          <a:bodyPr/>
+          <a:lstStyle/>
+          <a:p>
+            <a:pPr>
+              <a:defRPr>
+                <a:solidFill>
+                  <a:schemeClr val="accent3">
+                    <a:lumOff val="-12941"/>
+                  </a:schemeClr>
+                </a:solidFill>
+              </a:defRPr>
+            </a:pPr>
+            <a:r>
+              <a:t>("AI tools" OR "GPT tools" OR "AI resources" OR "AI catalog" OR "AI list" OR "AI repository" OR "generative AI") ("list" OR "collection" OR "catalog" OR "repository" OR "guide") </a:t>
+            </a:r>
+          </a:p>
+          <a:p>
+            <a:r>
+              <a:t>AI Master List Tool - </a:t>
+            </a:r>
+            <a:r>
+              <a:rPr u="sng">
+                <a:solidFill>
+                  <a:srgbClr val="0563C1"/>
+                </a:solidFill>
+                <a:uFill>
+                  <a:solidFill>
+                    <a:srgbClr val="0563C1"/>
+                  </a:solidFill>
+                </a:uFill>
+                <a:hlinkClick r:id="rId2"/>
+              </a:rPr>
+              <a:t>https://doc.clickup.com/25598832/d/h/rd6vg-14247/0b79ca1dc0f7429/rd6vg-12207</a:t>
+            </a:r>
+            <a:r>
+              <a:t> </a:t>
+            </a:r>
+          </a:p>
+          <a:p>
+            <a:r>
+              <a:t>AI Catalog Repo - </a:t>
+            </a:r>
+            <a:r>
+              <a:rPr u="sng">
+                <a:solidFill>
+                  <a:srgbClr val="0563C1"/>
+                </a:solidFill>
+                <a:uFill>
+                  <a:solidFill>
+                    <a:srgbClr val="0563C1"/>
+                  </a:solidFill>
+                </a:uFill>
+                <a:hlinkClick r:id="rId3"/>
+              </a:rPr>
+              <a:t>https://github.com/mehmetkahya0/ai-catalog</a:t>
+            </a:r>
+            <a:r>
+              <a:t> </a:t>
+            </a:r>
+          </a:p>
+          <a:p>
+            <a:r>
+              <a:t>- Awesome Generative AI - </a:t>
+            </a:r>
+            <a:r>
+              <a:rPr u="sng">
+                <a:solidFill>
+                  <a:srgbClr val="0563C1"/>
+                </a:solidFill>
+                <a:uFill>
+                  <a:solidFill>
+                    <a:srgbClr val="0563C1"/>
+                  </a:solidFill>
+                </a:uFill>
+                <a:hlinkClick r:id="rId4"/>
+              </a:rPr>
+              <a:t>https://github.com/amusi/awesome-ai-awesomeness</a:t>
+            </a:r>
+            <a:r>
+              <a:t> </a:t>
+            </a:r>
+          </a:p>
+          <a:p>
+            <a:r>
+              <a:t>FutureTools - </a:t>
+            </a:r>
+            <a:r>
+              <a:rPr u="sng">
+                <a:solidFill>
+                  <a:srgbClr val="0563C1"/>
+                </a:solidFill>
+                <a:uFill>
+                  <a:solidFill>
+                    <a:srgbClr val="0563C1"/>
+                  </a:solidFill>
+                </a:uFill>
+                <a:hlinkClick r:id="rId5"/>
+              </a:rPr>
+              <a:t>https://futuretools.io</a:t>
+            </a:r>
+            <a:r>
+              <a:t> </a:t>
+            </a:r>
+          </a:p>
+        </p:txBody>
+      </p:sp>
+      <p:sp>
+        <p:nvSpPr>
+          <p:cNvPr id="179" name="Slide Number"/>
           <p:cNvSpPr txBox="1">
             <a:spLocks noGrp="1"/>
           </p:cNvSpPr>
@@ -4655,7 +7736,7 @@
           </a:prstGeom>
           <a:extLst>
             <a:ext uri="{C572A759-6A51-4108-AA02-DFA0A04FC94B}">
-              <ma14:wrappingTextBoxFlag xmlns:ma14="http://schemas.microsoft.com/office/mac/drawingml/2011/main" xmlns:a14="http://schemas.microsoft.com/office/drawing/2010/main" xmlns:m="http://schemas.openxmlformats.org/officeDocument/2006/math" xmlns="" val="1"/>
+              <ma14:wrappingTextBoxFlag xmlns="" xmlns:m="http://schemas.openxmlformats.org/officeDocument/2006/math" xmlns:a14="http://schemas.microsoft.com/office/drawing/2010/main" xmlns:ma14="http://schemas.microsoft.com/office/mac/drawingml/2011/main" val="1"/>
             </a:ext>
           </a:extLst>
         </p:spPr>
@@ -4664,7 +7745,7 @@
           <a:lstStyle/>
           <a:p>
             <a:fld id="{86CB4B4D-7CA3-9044-876B-883B54F8677D}" type="slidenum">
-              <a:t>16</a:t>
+              <a:t>18</a:t>
             </a:fld>
             <a:endParaRPr/>
           </a:p>
@@ -4675,22 +7756,11 @@
   <p:clrMapOvr>
     <a:masterClrMapping/>
   </p:clrMapOvr>
-  <mc:AlternateContent xmlns:mc="http://schemas.openxmlformats.org/markup-compatibility/2006" xmlns:p14="http://schemas.microsoft.com/office/powerpoint/2010/main">
-    <mc:Choice Requires="p14">
-      <p:transition spd="slow" p14:dur="1200">
-        <p:push dir="u"/>
-      </p:transition>
-    </mc:Choice>
-    <mc:Fallback xmlns:a14="http://schemas.microsoft.com/office/drawing/2010/main" xmlns:m="http://schemas.openxmlformats.org/officeDocument/2006/math" xmlns="">
-      <p:transition spd="slow">
-        <p:fade/>
-      </p:transition>
-    </mc:Fallback>
-  </mc:AlternateContent>
+  <p:transition spd="med"/>
 </p:sld>
 </file>
 
-<file path=ppt/slides/slide17.xml><?xml version="1.0" encoding="utf-8"?>
+<file path=ppt/slides/slide19.xml><?xml version="1.0" encoding="utf-8"?>
 <p:sld xmlns:a="http://schemas.openxmlformats.org/drawingml/2006/main" xmlns:r="http://schemas.openxmlformats.org/officeDocument/2006/relationships" xmlns:p="http://schemas.openxmlformats.org/presentationml/2006/main">
   <p:cSld>
     <p:spTree>
@@ -4709,114 +7779,158 @@
       </p:grpSpPr>
       <p:sp>
         <p:nvSpPr>
-          <p:cNvPr id="198" name="Title 2"/>
+          <p:cNvPr id="181" name="Listas maestras de herramientas de IA"/>
           <p:cNvSpPr txBox="1">
             <a:spLocks noGrp="1"/>
           </p:cNvSpPr>
           <p:nvPr>
-            <p:ph type="title" idx="4294967295"/>
+            <p:ph type="title"/>
+          </p:nvPr>
+        </p:nvSpPr>
+        <p:spPr>
+          <a:prstGeom prst="rect">
+            <a:avLst/>
+          </a:prstGeom>
+        </p:spPr>
+        <p:txBody>
+          <a:bodyPr/>
+          <a:lstStyle/>
+          <a:p>
+            <a:r>
+              <a:t>Listas maestras de herramientas de IA</a:t>
+            </a:r>
+          </a:p>
+        </p:txBody>
+      </p:sp>
+      <p:sp>
+        <p:nvSpPr>
+          <p:cNvPr id="182" name="(&quot;AI tools&quot; OR &quot;GPT tools&quot; OR &quot;AI resources&quot; OR &quot;AI catalog&quot; OR &quot;AI list&quot; OR &quot;AI repository&quot; OR &quot;generative AI&quot;) (&quot;list&quot; OR &quot;collection&quot; OR &quot;catalog&quot; OR &quot;repository&quot; OR &quot;guide&quot;)…"/>
+          <p:cNvSpPr txBox="1">
+            <a:spLocks noGrp="1"/>
+          </p:cNvSpPr>
+          <p:nvPr>
+            <p:ph type="body" idx="1"/>
           </p:nvPr>
         </p:nvSpPr>
         <p:spPr>
           <a:xfrm>
-            <a:off x="2154607" y="2531859"/>
-            <a:ext cx="3658054" cy="1786516"/>
+            <a:off x="838200" y="1825625"/>
+            <a:ext cx="10515600" cy="4883132"/>
           </a:xfrm>
           <a:prstGeom prst="rect">
             <a:avLst/>
           </a:prstGeom>
         </p:spPr>
         <p:txBody>
-          <a:bodyPr anchor="t"/>
-          <a:lstStyle>
-            <a:lvl1pPr>
-              <a:defRPr sz="4800" b="0">
-                <a:solidFill>
-                  <a:srgbClr val="44546A"/>
-                </a:solidFill>
-                <a:latin typeface="Calibri Light"/>
-                <a:ea typeface="Calibri Light"/>
-                <a:cs typeface="Calibri Light"/>
-                <a:sym typeface="Calibri Light"/>
+          <a:bodyPr/>
+          <a:lstStyle/>
+          <a:p>
+            <a:pPr>
+              <a:defRPr i="1">
+                <a:solidFill>
+                  <a:schemeClr val="accent3">
+                    <a:lumOff val="-12941"/>
+                  </a:schemeClr>
+                </a:solidFill>
               </a:defRPr>
-            </a:lvl1pPr>
-          </a:lstStyle>
-          <a:p>
-            <a:r>
-              <a:t>TOMAR UN DESCANSO</a:t>
-            </a:r>
-          </a:p>
-        </p:txBody>
-      </p:sp>
-      <p:pic>
-        <p:nvPicPr>
-          <p:cNvPr id="199" name="Graphic 13" descr="Graphic 13"/>
-          <p:cNvPicPr>
-            <a:picLocks noChangeAspect="1"/>
-          </p:cNvPicPr>
-          <p:nvPr/>
-        </p:nvPicPr>
-        <p:blipFill>
-          <a:blip r:embed="rId2"/>
-          <a:stretch>
-            <a:fillRect/>
-          </a:stretch>
-        </p:blipFill>
-        <p:spPr>
-          <a:xfrm>
-            <a:off x="6379342" y="-259377"/>
-            <a:ext cx="5029201" cy="5029201"/>
-          </a:xfrm>
-          <a:prstGeom prst="rect">
-            <a:avLst/>
-          </a:prstGeom>
-          <a:ln w="12700">
-            <a:miter lim="400000"/>
-          </a:ln>
-        </p:spPr>
-      </p:pic>
-      <p:sp>
-        <p:nvSpPr>
-          <p:cNvPr id="200" name="TextBox 1"/>
-          <p:cNvSpPr txBox="1"/>
-          <p:nvPr/>
-        </p:nvSpPr>
-        <p:spPr>
-          <a:xfrm>
-            <a:off x="3715415" y="5405718"/>
-            <a:ext cx="4111933" cy="634118"/>
-          </a:xfrm>
-          <a:prstGeom prst="rect">
-            <a:avLst/>
-          </a:prstGeom>
-          <a:ln w="12700">
-            <a:miter lim="400000"/>
-          </a:ln>
-          <a:extLst>
-            <a:ext uri="{C572A759-6A51-4108-AA02-DFA0A04FC94B}">
-              <ma14:wrappingTextBoxFlag xmlns:ma14="http://schemas.microsoft.com/office/mac/drawingml/2011/main" xmlns:a14="http://schemas.microsoft.com/office/drawing/2010/main" xmlns:m="http://schemas.openxmlformats.org/officeDocument/2006/math" xmlns="" val="1"/>
-            </a:ext>
-          </a:extLst>
-        </p:spPr>
-        <p:txBody>
-          <a:bodyPr wrap="none" lIns="45719" rIns="45719">
-            <a:spAutoFit/>
-          </a:bodyPr>
-          <a:lstStyle>
-            <a:lvl1pPr>
-              <a:defRPr sz="4200" b="1"/>
-            </a:lvl1pPr>
-          </a:lstStyle>
-          <a:p>
-            <a:r>
-              <a:t>Volver por: XX:XX </a:t>
+            </a:pPr>
+            <a:r>
+              <a:t>("AI tools" OR "GPT tools" OR "AI resources" OR "AI catalog" OR "AI list" OR "AI repository" OR "generative AI") ("list" OR "collection" OR "catalog" OR "repository" OR "guide") </a:t>
+            </a:r>
+          </a:p>
+          <a:p>
+            <a:r>
+              <a:t>Herramienta de lista maestra de IA - </a:t>
+            </a:r>
+            <a:r>
+              <a:rPr u="sng">
+                <a:solidFill>
+                  <a:srgbClr val="0563C1"/>
+                </a:solidFill>
+                <a:uFill>
+                  <a:solidFill>
+                    <a:srgbClr val="0563C1"/>
+                  </a:solidFill>
+                </a:uFill>
+                <a:hlinkClick r:id="rId2"/>
+              </a:rPr>
+              <a:t>https://doc.clickup.com/25598832/d/h/rd6vg-14247/0b79ca1dc0f7429/rd6vg-12207</a:t>
+            </a:r>
+            <a:r>
+              <a:t> </a:t>
+            </a:r>
+          </a:p>
+          <a:p>
+            <a:r>
+              <a:t>Repositorio de catálogos de IA - </a:t>
+            </a:r>
+            <a:r>
+              <a:rPr u="sng">
+                <a:solidFill>
+                  <a:srgbClr val="0563C1"/>
+                </a:solidFill>
+                <a:uFill>
+                  <a:solidFill>
+                    <a:srgbClr val="0563C1"/>
+                  </a:solidFill>
+                </a:uFill>
+                <a:hlinkClick r:id="rId3"/>
+              </a:rPr>
+              <a:t>https://github.com/mehmetkahya0/ai-catalog</a:t>
+            </a:r>
+            <a:r>
+              <a:t> </a:t>
+            </a:r>
+          </a:p>
+          <a:p>
+            <a:r>
+              <a:t>Impresionante IA generativa - </a:t>
+            </a:r>
+            <a:r>
+              <a:rPr u="sng">
+                <a:solidFill>
+                  <a:srgbClr val="0563C1"/>
+                </a:solidFill>
+                <a:uFill>
+                  <a:solidFill>
+                    <a:srgbClr val="0563C1"/>
+                  </a:solidFill>
+                </a:uFill>
+                <a:hlinkClick r:id="rId4"/>
+              </a:rPr>
+              <a:t>https://github.com/amusi/awesome-ai-awesomeness</a:t>
+            </a:r>
+            <a:r>
+              <a:t> </a:t>
+            </a:r>
+          </a:p>
+          <a:p>
+            <a:r>
+              <a:t>FutureTools - </a:t>
+            </a:r>
+            <a:r>
+              <a:rPr u="sng">
+                <a:solidFill>
+                  <a:srgbClr val="0563C1"/>
+                </a:solidFill>
+                <a:uFill>
+                  <a:solidFill>
+                    <a:srgbClr val="0563C1"/>
+                  </a:solidFill>
+                </a:uFill>
+                <a:hlinkClick r:id="rId5"/>
+              </a:rPr>
+              <a:t>https://futuretools.io</a:t>
+            </a:r>
+            <a:r>
+              <a:t> </a:t>
             </a:r>
           </a:p>
         </p:txBody>
       </p:sp>
       <p:sp>
         <p:nvSpPr>
-          <p:cNvPr id="201" name="Slide Number"/>
+          <p:cNvPr id="183" name="Slide Number"/>
           <p:cNvSpPr txBox="1">
             <a:spLocks noGrp="1"/>
           </p:cNvSpPr>
@@ -4830,7 +7944,7 @@
           </a:prstGeom>
           <a:extLst>
             <a:ext uri="{C572A759-6A51-4108-AA02-DFA0A04FC94B}">
-              <ma14:wrappingTextBoxFlag xmlns:ma14="http://schemas.microsoft.com/office/mac/drawingml/2011/main" xmlns:a14="http://schemas.microsoft.com/office/drawing/2010/main" xmlns:m="http://schemas.openxmlformats.org/officeDocument/2006/math" xmlns="" val="1"/>
+              <ma14:wrappingTextBoxFlag xmlns="" xmlns:m="http://schemas.openxmlformats.org/officeDocument/2006/math" xmlns:a14="http://schemas.microsoft.com/office/drawing/2010/main" xmlns:ma14="http://schemas.microsoft.com/office/mac/drawingml/2011/main" val="1"/>
             </a:ext>
           </a:extLst>
         </p:spPr>
@@ -4839,7 +7953,7 @@
           <a:lstStyle/>
           <a:p>
             <a:fld id="{86CB4B4D-7CA3-9044-876B-883B54F8677D}" type="slidenum">
-              <a:t>17</a:t>
+              <a:t>19</a:t>
             </a:fld>
             <a:endParaRPr/>
           </a:p>
@@ -4954,6 +8068,353 @@
 </p:sld>
 </file>
 
+<file path=ppt/slides/slide20.xml><?xml version="1.0" encoding="utf-8"?>
+<p:sld xmlns:a="http://schemas.openxmlformats.org/drawingml/2006/main" xmlns:r="http://schemas.openxmlformats.org/officeDocument/2006/relationships" xmlns:p="http://schemas.openxmlformats.org/presentationml/2006/main">
+  <p:cSld>
+    <p:bg>
+      <p:bgPr>
+        <a:solidFill>
+          <a:srgbClr val="FFFB00"/>
+        </a:solidFill>
+        <a:effectLst/>
+      </p:bgPr>
+    </p:bg>
+    <p:spTree>
+      <p:nvGrpSpPr>
+        <p:cNvPr id="1" name=""/>
+        <p:cNvGrpSpPr/>
+        <p:nvPr/>
+      </p:nvGrpSpPr>
+      <p:grpSpPr>
+        <a:xfrm>
+          <a:off x="0" y="0"/>
+          <a:ext cx="0" cy="0"/>
+          <a:chOff x="0" y="0"/>
+          <a:chExt cx="0" cy="0"/>
+        </a:xfrm>
+      </p:grpSpPr>
+      <p:sp>
+        <p:nvSpPr>
+          <p:cNvPr id="193" name="Title 2"/>
+          <p:cNvSpPr txBox="1">
+            <a:spLocks noGrp="1"/>
+          </p:cNvSpPr>
+          <p:nvPr>
+            <p:ph type="title" idx="4294967295"/>
+          </p:nvPr>
+        </p:nvSpPr>
+        <p:spPr>
+          <a:xfrm>
+            <a:off x="2154607" y="2531859"/>
+            <a:ext cx="3658054" cy="1786516"/>
+          </a:xfrm>
+          <a:prstGeom prst="rect">
+            <a:avLst/>
+          </a:prstGeom>
+        </p:spPr>
+        <p:txBody>
+          <a:bodyPr anchor="t"/>
+          <a:lstStyle>
+            <a:lvl1pPr>
+              <a:defRPr sz="4800" b="0">
+                <a:solidFill>
+                  <a:srgbClr val="44546A"/>
+                </a:solidFill>
+                <a:latin typeface="Calibri Light"/>
+                <a:ea typeface="Calibri Light"/>
+                <a:cs typeface="Calibri Light"/>
+                <a:sym typeface="Calibri Light"/>
+              </a:defRPr>
+            </a:lvl1pPr>
+          </a:lstStyle>
+          <a:p>
+            <a:r>
+              <a:t>TAKE A BREAK</a:t>
+            </a:r>
+          </a:p>
+        </p:txBody>
+      </p:sp>
+      <p:pic>
+        <p:nvPicPr>
+          <p:cNvPr id="194" name="Graphic 13" descr="Graphic 13"/>
+          <p:cNvPicPr>
+            <a:picLocks noChangeAspect="1"/>
+          </p:cNvPicPr>
+          <p:nvPr/>
+        </p:nvPicPr>
+        <p:blipFill>
+          <a:blip r:embed="rId2"/>
+          <a:stretch>
+            <a:fillRect/>
+          </a:stretch>
+        </p:blipFill>
+        <p:spPr>
+          <a:xfrm>
+            <a:off x="6379342" y="-259377"/>
+            <a:ext cx="5029201" cy="5029201"/>
+          </a:xfrm>
+          <a:prstGeom prst="rect">
+            <a:avLst/>
+          </a:prstGeom>
+          <a:ln w="12700">
+            <a:miter lim="400000"/>
+          </a:ln>
+        </p:spPr>
+      </p:pic>
+      <p:sp>
+        <p:nvSpPr>
+          <p:cNvPr id="195" name="TextBox 1"/>
+          <p:cNvSpPr txBox="1"/>
+          <p:nvPr/>
+        </p:nvSpPr>
+        <p:spPr>
+          <a:xfrm>
+            <a:off x="3715415" y="5405718"/>
+            <a:ext cx="3986136" cy="634118"/>
+          </a:xfrm>
+          <a:prstGeom prst="rect">
+            <a:avLst/>
+          </a:prstGeom>
+          <a:ln w="12700">
+            <a:miter lim="400000"/>
+          </a:ln>
+          <a:extLst>
+            <a:ext uri="{C572A759-6A51-4108-AA02-DFA0A04FC94B}">
+              <ma14:wrappingTextBoxFlag xmlns="" xmlns:m="http://schemas.openxmlformats.org/officeDocument/2006/math" xmlns:a14="http://schemas.microsoft.com/office/drawing/2010/main" xmlns:ma14="http://schemas.microsoft.com/office/mac/drawingml/2011/main" val="1"/>
+            </a:ext>
+          </a:extLst>
+        </p:spPr>
+        <p:txBody>
+          <a:bodyPr wrap="none" lIns="45719" rIns="45719">
+            <a:spAutoFit/>
+          </a:bodyPr>
+          <a:lstStyle>
+            <a:lvl1pPr>
+              <a:defRPr sz="4200" b="1"/>
+            </a:lvl1pPr>
+          </a:lstStyle>
+          <a:p>
+            <a:r>
+              <a:t>Return By: XX:XX </a:t>
+            </a:r>
+          </a:p>
+        </p:txBody>
+      </p:sp>
+      <p:sp>
+        <p:nvSpPr>
+          <p:cNvPr id="196" name="Slide Number"/>
+          <p:cNvSpPr txBox="1">
+            <a:spLocks noGrp="1"/>
+          </p:cNvSpPr>
+          <p:nvPr>
+            <p:ph type="sldNum" sz="quarter" idx="2"/>
+          </p:nvPr>
+        </p:nvSpPr>
+        <p:spPr>
+          <a:prstGeom prst="rect">
+            <a:avLst/>
+          </a:prstGeom>
+          <a:extLst>
+            <a:ext uri="{C572A759-6A51-4108-AA02-DFA0A04FC94B}">
+              <ma14:wrappingTextBoxFlag xmlns="" xmlns:m="http://schemas.openxmlformats.org/officeDocument/2006/math" xmlns:a14="http://schemas.microsoft.com/office/drawing/2010/main" xmlns:ma14="http://schemas.microsoft.com/office/mac/drawingml/2011/main" val="1"/>
+            </a:ext>
+          </a:extLst>
+        </p:spPr>
+        <p:txBody>
+          <a:bodyPr/>
+          <a:lstStyle/>
+          <a:p>
+            <a:fld id="{86CB4B4D-7CA3-9044-876B-883B54F8677D}" type="slidenum">
+              <a:t>20</a:t>
+            </a:fld>
+            <a:endParaRPr/>
+          </a:p>
+        </p:txBody>
+      </p:sp>
+    </p:spTree>
+  </p:cSld>
+  <p:clrMapOvr>
+    <a:masterClrMapping/>
+  </p:clrMapOvr>
+  <mc:AlternateContent xmlns:mc="http://schemas.openxmlformats.org/markup-compatibility/2006" xmlns:p14="http://schemas.microsoft.com/office/powerpoint/2010/main">
+    <mc:Choice Requires="p14">
+      <p:transition spd="slow" p14:dur="1200">
+        <p:push dir="u"/>
+      </p:transition>
+    </mc:Choice>
+    <mc:Fallback xmlns="" xmlns:m="http://schemas.openxmlformats.org/officeDocument/2006/math" xmlns:a14="http://schemas.microsoft.com/office/drawing/2010/main">
+      <p:transition spd="slow">
+        <p:fade/>
+      </p:transition>
+    </mc:Fallback>
+  </mc:AlternateContent>
+</p:sld>
+</file>
+
+<file path=ppt/slides/slide21.xml><?xml version="1.0" encoding="utf-8"?>
+<p:sld xmlns:a="http://schemas.openxmlformats.org/drawingml/2006/main" xmlns:r="http://schemas.openxmlformats.org/officeDocument/2006/relationships" xmlns:p="http://schemas.openxmlformats.org/presentationml/2006/main">
+  <p:cSld>
+    <p:spTree>
+      <p:nvGrpSpPr>
+        <p:cNvPr id="1" name=""/>
+        <p:cNvGrpSpPr/>
+        <p:nvPr/>
+      </p:nvGrpSpPr>
+      <p:grpSpPr>
+        <a:xfrm>
+          <a:off x="0" y="0"/>
+          <a:ext cx="0" cy="0"/>
+          <a:chOff x="0" y="0"/>
+          <a:chExt cx="0" cy="0"/>
+        </a:xfrm>
+      </p:grpSpPr>
+      <p:sp>
+        <p:nvSpPr>
+          <p:cNvPr id="198" name="Title 2"/>
+          <p:cNvSpPr txBox="1">
+            <a:spLocks noGrp="1"/>
+          </p:cNvSpPr>
+          <p:nvPr>
+            <p:ph type="title" idx="4294967295"/>
+          </p:nvPr>
+        </p:nvSpPr>
+        <p:spPr>
+          <a:xfrm>
+            <a:off x="2154607" y="2531859"/>
+            <a:ext cx="3658054" cy="1786516"/>
+          </a:xfrm>
+          <a:prstGeom prst="rect">
+            <a:avLst/>
+          </a:prstGeom>
+        </p:spPr>
+        <p:txBody>
+          <a:bodyPr anchor="t"/>
+          <a:lstStyle>
+            <a:lvl1pPr>
+              <a:defRPr sz="4800" b="0">
+                <a:solidFill>
+                  <a:srgbClr val="44546A"/>
+                </a:solidFill>
+                <a:latin typeface="Calibri Light"/>
+                <a:ea typeface="Calibri Light"/>
+                <a:cs typeface="Calibri Light"/>
+                <a:sym typeface="Calibri Light"/>
+              </a:defRPr>
+            </a:lvl1pPr>
+          </a:lstStyle>
+          <a:p>
+            <a:r>
+              <a:t>TOMAR UN DESCANSO</a:t>
+            </a:r>
+          </a:p>
+        </p:txBody>
+      </p:sp>
+      <p:pic>
+        <p:nvPicPr>
+          <p:cNvPr id="199" name="Graphic 13" descr="Graphic 13"/>
+          <p:cNvPicPr>
+            <a:picLocks noChangeAspect="1"/>
+          </p:cNvPicPr>
+          <p:nvPr/>
+        </p:nvPicPr>
+        <p:blipFill>
+          <a:blip r:embed="rId2"/>
+          <a:stretch>
+            <a:fillRect/>
+          </a:stretch>
+        </p:blipFill>
+        <p:spPr>
+          <a:xfrm>
+            <a:off x="6379342" y="-259377"/>
+            <a:ext cx="5029201" cy="5029201"/>
+          </a:xfrm>
+          <a:prstGeom prst="rect">
+            <a:avLst/>
+          </a:prstGeom>
+          <a:ln w="12700">
+            <a:miter lim="400000"/>
+          </a:ln>
+        </p:spPr>
+      </p:pic>
+      <p:sp>
+        <p:nvSpPr>
+          <p:cNvPr id="200" name="TextBox 1"/>
+          <p:cNvSpPr txBox="1"/>
+          <p:nvPr/>
+        </p:nvSpPr>
+        <p:spPr>
+          <a:xfrm>
+            <a:off x="3715415" y="5405718"/>
+            <a:ext cx="4111933" cy="634118"/>
+          </a:xfrm>
+          <a:prstGeom prst="rect">
+            <a:avLst/>
+          </a:prstGeom>
+          <a:ln w="12700">
+            <a:miter lim="400000"/>
+          </a:ln>
+          <a:extLst>
+            <a:ext uri="{C572A759-6A51-4108-AA02-DFA0A04FC94B}">
+              <ma14:wrappingTextBoxFlag xmlns="" xmlns:m="http://schemas.openxmlformats.org/officeDocument/2006/math" xmlns:a14="http://schemas.microsoft.com/office/drawing/2010/main" xmlns:ma14="http://schemas.microsoft.com/office/mac/drawingml/2011/main" val="1"/>
+            </a:ext>
+          </a:extLst>
+        </p:spPr>
+        <p:txBody>
+          <a:bodyPr wrap="none" lIns="45719" rIns="45719">
+            <a:spAutoFit/>
+          </a:bodyPr>
+          <a:lstStyle>
+            <a:lvl1pPr>
+              <a:defRPr sz="4200" b="1"/>
+            </a:lvl1pPr>
+          </a:lstStyle>
+          <a:p>
+            <a:r>
+              <a:t>Volver por: XX:XX </a:t>
+            </a:r>
+          </a:p>
+        </p:txBody>
+      </p:sp>
+      <p:sp>
+        <p:nvSpPr>
+          <p:cNvPr id="201" name="Slide Number"/>
+          <p:cNvSpPr txBox="1">
+            <a:spLocks noGrp="1"/>
+          </p:cNvSpPr>
+          <p:nvPr>
+            <p:ph type="sldNum" sz="quarter" idx="2"/>
+          </p:nvPr>
+        </p:nvSpPr>
+        <p:spPr>
+          <a:prstGeom prst="rect">
+            <a:avLst/>
+          </a:prstGeom>
+          <a:extLst>
+            <a:ext uri="{C572A759-6A51-4108-AA02-DFA0A04FC94B}">
+              <ma14:wrappingTextBoxFlag xmlns="" xmlns:m="http://schemas.openxmlformats.org/officeDocument/2006/math" xmlns:a14="http://schemas.microsoft.com/office/drawing/2010/main" xmlns:ma14="http://schemas.microsoft.com/office/mac/drawingml/2011/main" val="1"/>
+            </a:ext>
+          </a:extLst>
+        </p:spPr>
+        <p:txBody>
+          <a:bodyPr/>
+          <a:lstStyle/>
+          <a:p>
+            <a:fld id="{86CB4B4D-7CA3-9044-876B-883B54F8677D}" type="slidenum">
+              <a:t>21</a:t>
+            </a:fld>
+            <a:endParaRPr/>
+          </a:p>
+        </p:txBody>
+      </p:sp>
+    </p:spTree>
+  </p:cSld>
+  <p:clrMapOvr>
+    <a:masterClrMapping/>
+  </p:clrMapOvr>
+  <p:transition spd="med"/>
+</p:sld>
+</file>
+
 <file path=ppt/slides/slide3.xml><?xml version="1.0" encoding="utf-8"?>
 <p:sld xmlns:a="http://schemas.openxmlformats.org/drawingml/2006/main" xmlns:r="http://schemas.openxmlformats.org/officeDocument/2006/relationships" xmlns:p="http://schemas.openxmlformats.org/presentationml/2006/main">
   <p:cSld>
@@ -5003,6 +8464,7 @@
           <a:lstStyle/>
           <a:p>
             <a:r>
+              <a:rPr dirty="0"/>
               <a:t>Best Practices for Generating AI Content</a:t>
             </a:r>
           </a:p>
@@ -5303,7 +8765,7 @@
           </a:ln>
           <a:extLst>
             <a:ext uri="{C572A759-6A51-4108-AA02-DFA0A04FC94B}">
-              <ma14:wrappingTextBoxFlag xmlns:ma14="http://schemas.microsoft.com/office/mac/drawingml/2011/main" xmlns:a14="http://schemas.microsoft.com/office/drawing/2010/main" xmlns:m="http://schemas.openxmlformats.org/officeDocument/2006/math" xmlns="" val="1"/>
+              <ma14:wrappingTextBoxFlag xmlns="" xmlns:m="http://schemas.openxmlformats.org/officeDocument/2006/math" xmlns:a14="http://schemas.microsoft.com/office/drawing/2010/main" xmlns:ma14="http://schemas.microsoft.com/office/mac/drawingml/2011/main" val="1"/>
             </a:ext>
           </a:extLst>
         </p:spPr>
@@ -5581,7 +9043,7 @@
           </a:prstGeom>
           <a:extLst>
             <a:ext uri="{C572A759-6A51-4108-AA02-DFA0A04FC94B}">
-              <ma14:wrappingTextBoxFlag xmlns:ma14="http://schemas.microsoft.com/office/mac/drawingml/2011/main" xmlns:a14="http://schemas.microsoft.com/office/drawing/2010/main" xmlns:m="http://schemas.openxmlformats.org/officeDocument/2006/math" xmlns="" val="1"/>
+              <ma14:wrappingTextBoxFlag xmlns="" xmlns:m="http://schemas.openxmlformats.org/officeDocument/2006/math" xmlns:a14="http://schemas.microsoft.com/office/drawing/2010/main" xmlns:ma14="http://schemas.microsoft.com/office/mac/drawingml/2011/main" val="1"/>
             </a:ext>
           </a:extLst>
         </p:spPr>
@@ -5650,7 +9112,7 @@
           </a:prstGeom>
           <a:extLst>
             <a:ext uri="{C572A759-6A51-4108-AA02-DFA0A04FC94B}">
-              <ma14:wrappingTextBoxFlag xmlns:ma14="http://schemas.microsoft.com/office/mac/drawingml/2011/main" xmlns:a14="http://schemas.microsoft.com/office/drawing/2010/main" xmlns:m="http://schemas.openxmlformats.org/officeDocument/2006/math" xmlns="" val="1"/>
+              <ma14:wrappingTextBoxFlag xmlns="" xmlns:m="http://schemas.openxmlformats.org/officeDocument/2006/math" xmlns:a14="http://schemas.microsoft.com/office/drawing/2010/main" xmlns:ma14="http://schemas.microsoft.com/office/mac/drawingml/2011/main" val="1"/>
             </a:ext>
           </a:extLst>
         </p:spPr>
@@ -6027,7 +9489,7 @@
           </a:ln>
           <a:extLst>
             <a:ext uri="{C572A759-6A51-4108-AA02-DFA0A04FC94B}">
-              <ma14:wrappingTextBoxFlag xmlns:ma14="http://schemas.microsoft.com/office/mac/drawingml/2011/main" xmlns:a14="http://schemas.microsoft.com/office/drawing/2010/main" xmlns:m="http://schemas.openxmlformats.org/officeDocument/2006/math" xmlns="" val="1"/>
+              <ma14:wrappingTextBoxFlag xmlns="" xmlns:m="http://schemas.openxmlformats.org/officeDocument/2006/math" xmlns:a14="http://schemas.microsoft.com/office/drawing/2010/main" xmlns:ma14="http://schemas.microsoft.com/office/mac/drawingml/2011/main" val="1"/>
             </a:ext>
           </a:extLst>
         </p:spPr>
@@ -6304,7 +9766,7 @@
           </a:ln>
           <a:extLst>
             <a:ext uri="{C572A759-6A51-4108-AA02-DFA0A04FC94B}">
-              <ma14:wrappingTextBoxFlag xmlns:ma14="http://schemas.microsoft.com/office/mac/drawingml/2011/main" xmlns:a14="http://schemas.microsoft.com/office/drawing/2010/main" xmlns:m="http://schemas.openxmlformats.org/officeDocument/2006/math" xmlns="" val="1"/>
+              <ma14:wrappingTextBoxFlag xmlns="" xmlns:m="http://schemas.openxmlformats.org/officeDocument/2006/math" xmlns:a14="http://schemas.microsoft.com/office/drawing/2010/main" xmlns:ma14="http://schemas.microsoft.com/office/mac/drawingml/2011/main" val="1"/>
             </a:ext>
           </a:extLst>
         </p:spPr>
@@ -6375,7 +9837,7 @@
           </a:prstGeom>
           <a:extLst>
             <a:ext uri="{C572A759-6A51-4108-AA02-DFA0A04FC94B}">
-              <ma14:wrappingTextBoxFlag xmlns:ma14="http://schemas.microsoft.com/office/mac/drawingml/2011/main" xmlns:a14="http://schemas.microsoft.com/office/drawing/2010/main" xmlns:m="http://schemas.openxmlformats.org/officeDocument/2006/math" xmlns="" val="1"/>
+              <ma14:wrappingTextBoxFlag xmlns="" xmlns:m="http://schemas.openxmlformats.org/officeDocument/2006/math" xmlns:a14="http://schemas.microsoft.com/office/drawing/2010/main" xmlns:ma14="http://schemas.microsoft.com/office/mac/drawingml/2011/main" val="1"/>
             </a:ext>
           </a:extLst>
         </p:spPr>
@@ -6695,7 +10157,7 @@
           </a:ln>
           <a:extLst>
             <a:ext uri="{C572A759-6A51-4108-AA02-DFA0A04FC94B}">
-              <ma14:wrappingTextBoxFlag xmlns:ma14="http://schemas.microsoft.com/office/mac/drawingml/2011/main" xmlns:a14="http://schemas.microsoft.com/office/drawing/2010/main" xmlns:m="http://schemas.openxmlformats.org/officeDocument/2006/math" xmlns="" val="1"/>
+              <ma14:wrappingTextBoxFlag xmlns="" xmlns:m="http://schemas.openxmlformats.org/officeDocument/2006/math" xmlns:a14="http://schemas.microsoft.com/office/drawing/2010/main" xmlns:ma14="http://schemas.microsoft.com/office/mac/drawingml/2011/main" val="1"/>
             </a:ext>
           </a:extLst>
         </p:spPr>
@@ -6939,7 +10401,7 @@
           </a:ln>
           <a:extLst>
             <a:ext uri="{C572A759-6A51-4108-AA02-DFA0A04FC94B}">
-              <ma14:wrappingTextBoxFlag xmlns:ma14="http://schemas.microsoft.com/office/mac/drawingml/2011/main" xmlns:a14="http://schemas.microsoft.com/office/drawing/2010/main" xmlns:m="http://schemas.openxmlformats.org/officeDocument/2006/math" xmlns="" val="1"/>
+              <ma14:wrappingTextBoxFlag xmlns="" xmlns:m="http://schemas.openxmlformats.org/officeDocument/2006/math" xmlns:a14="http://schemas.microsoft.com/office/drawing/2010/main" xmlns:ma14="http://schemas.microsoft.com/office/mac/drawingml/2011/main" val="1"/>
             </a:ext>
           </a:extLst>
         </p:spPr>
@@ -7113,7 +10575,7 @@
           </a:prstGeom>
           <a:extLst>
             <a:ext uri="{C572A759-6A51-4108-AA02-DFA0A04FC94B}">
-              <ma14:wrappingTextBoxFlag xmlns:ma14="http://schemas.microsoft.com/office/mac/drawingml/2011/main" xmlns:a14="http://schemas.microsoft.com/office/drawing/2010/main" xmlns:m="http://schemas.openxmlformats.org/officeDocument/2006/math" xmlns="" val="1"/>
+              <ma14:wrappingTextBoxFlag xmlns="" xmlns:m="http://schemas.openxmlformats.org/officeDocument/2006/math" xmlns:a14="http://schemas.microsoft.com/office/drawing/2010/main" xmlns:ma14="http://schemas.microsoft.com/office/mac/drawingml/2011/main" val="1"/>
             </a:ext>
           </a:extLst>
         </p:spPr>
@@ -7269,7 +10731,7 @@
           </a:prstGeom>
           <a:extLst>
             <a:ext uri="{C572A759-6A51-4108-AA02-DFA0A04FC94B}">
-              <ma14:wrappingTextBoxFlag xmlns:ma14="http://schemas.microsoft.com/office/mac/drawingml/2011/main" xmlns:a14="http://schemas.microsoft.com/office/drawing/2010/main" xmlns:m="http://schemas.openxmlformats.org/officeDocument/2006/math" xmlns="" val="1"/>
+              <ma14:wrappingTextBoxFlag xmlns="" xmlns:m="http://schemas.openxmlformats.org/officeDocument/2006/math" xmlns:a14="http://schemas.microsoft.com/office/drawing/2010/main" xmlns:ma14="http://schemas.microsoft.com/office/mac/drawingml/2011/main" val="1"/>
             </a:ext>
           </a:extLst>
         </p:spPr>
@@ -7455,7 +10917,7 @@
           </a:prstGeom>
           <a:extLst>
             <a:ext uri="{C572A759-6A51-4108-AA02-DFA0A04FC94B}">
-              <ma14:wrappingTextBoxFlag xmlns:ma14="http://schemas.microsoft.com/office/mac/drawingml/2011/main" xmlns:a14="http://schemas.microsoft.com/office/drawing/2010/main" xmlns:m="http://schemas.openxmlformats.org/officeDocument/2006/math" xmlns="" val="1"/>
+              <ma14:wrappingTextBoxFlag xmlns="" xmlns:m="http://schemas.openxmlformats.org/officeDocument/2006/math" xmlns:a14="http://schemas.microsoft.com/office/drawing/2010/main" xmlns:ma14="http://schemas.microsoft.com/office/mac/drawingml/2011/main" val="1"/>
             </a:ext>
           </a:extLst>
         </p:spPr>
@@ -7622,7 +11084,7 @@
           </a:prstGeom>
           <a:extLst>
             <a:ext uri="{C572A759-6A51-4108-AA02-DFA0A04FC94B}">
-              <ma14:wrappingTextBoxFlag xmlns:ma14="http://schemas.microsoft.com/office/mac/drawingml/2011/main" xmlns:a14="http://schemas.microsoft.com/office/drawing/2010/main" xmlns:m="http://schemas.openxmlformats.org/officeDocument/2006/math" xmlns="" val="1"/>
+              <ma14:wrappingTextBoxFlag xmlns="" xmlns:m="http://schemas.openxmlformats.org/officeDocument/2006/math" xmlns:a14="http://schemas.microsoft.com/office/drawing/2010/main" xmlns:ma14="http://schemas.microsoft.com/office/mac/drawingml/2011/main" val="1"/>
             </a:ext>
           </a:extLst>
         </p:spPr>

</xml_diff>